<commit_message>
Revert "Merge branch 'master' of https://github.com/Dominic-C/50.003_ESC"
This reverts commit 2c2595967a3ee7e2b9970f08dbb37eefee14afac, reversing
changes made to 5d9940195a3e68d4bc1bf40bd92c3dd0298fc5e6.
</commit_message>
<xml_diff>
--- a/Gantt Chart.pptx
+++ b/Gantt Chart.pptx
@@ -2,18 +2,18 @@
 <file path=ppt/presentation.xml><?xml version="1.0" encoding="utf-8"?>
 <p:presentation xmlns:a="http://schemas.openxmlformats.org/drawingml/2006/main" xmlns:r="http://schemas.openxmlformats.org/officeDocument/2006/relationships" xmlns:p="http://schemas.openxmlformats.org/presentationml/2006/main" saveSubsetFonts="1">
   <p:sldMasterIdLst>
-    <p:sldMasterId id="2147483648" r:id="rId1"/>
+    <p:sldMasterId id="2147483660" r:id="rId1"/>
   </p:sldMasterIdLst>
   <p:sldIdLst>
     <p:sldId id="256" r:id="rId2"/>
   </p:sldIdLst>
-  <p:sldSz cx="12192000" cy="6858000"/>
+  <p:sldSz cx="12801600" cy="9601200" type="A3"/>
   <p:notesSz cx="6858000" cy="9144000"/>
   <p:defaultTextStyle>
     <a:defPPr>
       <a:defRPr lang="en-US"/>
     </a:defPPr>
-    <a:lvl1pPr marL="0" algn="l" defTabSz="914400" rtl="0" eaLnBrk="1" latinLnBrk="0" hangingPunct="1">
+    <a:lvl1pPr marL="0" algn="l" defTabSz="457200" rtl="0" eaLnBrk="1" latinLnBrk="0" hangingPunct="1">
       <a:defRPr sz="1800" kern="1200">
         <a:solidFill>
           <a:schemeClr val="tx1"/>
@@ -23,7 +23,7 @@
         <a:cs typeface="+mn-cs"/>
       </a:defRPr>
     </a:lvl1pPr>
-    <a:lvl2pPr marL="457200" algn="l" defTabSz="914400" rtl="0" eaLnBrk="1" latinLnBrk="0" hangingPunct="1">
+    <a:lvl2pPr marL="457200" algn="l" defTabSz="457200" rtl="0" eaLnBrk="1" latinLnBrk="0" hangingPunct="1">
       <a:defRPr sz="1800" kern="1200">
         <a:solidFill>
           <a:schemeClr val="tx1"/>
@@ -33,7 +33,7 @@
         <a:cs typeface="+mn-cs"/>
       </a:defRPr>
     </a:lvl2pPr>
-    <a:lvl3pPr marL="914400" algn="l" defTabSz="914400" rtl="0" eaLnBrk="1" latinLnBrk="0" hangingPunct="1">
+    <a:lvl3pPr marL="914400" algn="l" defTabSz="457200" rtl="0" eaLnBrk="1" latinLnBrk="0" hangingPunct="1">
       <a:defRPr sz="1800" kern="1200">
         <a:solidFill>
           <a:schemeClr val="tx1"/>
@@ -43,7 +43,7 @@
         <a:cs typeface="+mn-cs"/>
       </a:defRPr>
     </a:lvl3pPr>
-    <a:lvl4pPr marL="1371600" algn="l" defTabSz="914400" rtl="0" eaLnBrk="1" latinLnBrk="0" hangingPunct="1">
+    <a:lvl4pPr marL="1371600" algn="l" defTabSz="457200" rtl="0" eaLnBrk="1" latinLnBrk="0" hangingPunct="1">
       <a:defRPr sz="1800" kern="1200">
         <a:solidFill>
           <a:schemeClr val="tx1"/>
@@ -53,7 +53,7 @@
         <a:cs typeface="+mn-cs"/>
       </a:defRPr>
     </a:lvl4pPr>
-    <a:lvl5pPr marL="1828800" algn="l" defTabSz="914400" rtl="0" eaLnBrk="1" latinLnBrk="0" hangingPunct="1">
+    <a:lvl5pPr marL="1828800" algn="l" defTabSz="457200" rtl="0" eaLnBrk="1" latinLnBrk="0" hangingPunct="1">
       <a:defRPr sz="1800" kern="1200">
         <a:solidFill>
           <a:schemeClr val="tx1"/>
@@ -63,7 +63,7 @@
         <a:cs typeface="+mn-cs"/>
       </a:defRPr>
     </a:lvl5pPr>
-    <a:lvl6pPr marL="2286000" algn="l" defTabSz="914400" rtl="0" eaLnBrk="1" latinLnBrk="0" hangingPunct="1">
+    <a:lvl6pPr marL="2286000" algn="l" defTabSz="457200" rtl="0" eaLnBrk="1" latinLnBrk="0" hangingPunct="1">
       <a:defRPr sz="1800" kern="1200">
         <a:solidFill>
           <a:schemeClr val="tx1"/>
@@ -73,7 +73,7 @@
         <a:cs typeface="+mn-cs"/>
       </a:defRPr>
     </a:lvl6pPr>
-    <a:lvl7pPr marL="2743200" algn="l" defTabSz="914400" rtl="0" eaLnBrk="1" latinLnBrk="0" hangingPunct="1">
+    <a:lvl7pPr marL="2743200" algn="l" defTabSz="457200" rtl="0" eaLnBrk="1" latinLnBrk="0" hangingPunct="1">
       <a:defRPr sz="1800" kern="1200">
         <a:solidFill>
           <a:schemeClr val="tx1"/>
@@ -83,7 +83,7 @@
         <a:cs typeface="+mn-cs"/>
       </a:defRPr>
     </a:lvl7pPr>
-    <a:lvl8pPr marL="3200400" algn="l" defTabSz="914400" rtl="0" eaLnBrk="1" latinLnBrk="0" hangingPunct="1">
+    <a:lvl8pPr marL="3200400" algn="l" defTabSz="457200" rtl="0" eaLnBrk="1" latinLnBrk="0" hangingPunct="1">
       <a:defRPr sz="1800" kern="1200">
         <a:solidFill>
           <a:schemeClr val="tx1"/>
@@ -93,7 +93,7 @@
         <a:cs typeface="+mn-cs"/>
       </a:defRPr>
     </a:lvl8pPr>
-    <a:lvl9pPr marL="3657600" algn="l" defTabSz="914400" rtl="0" eaLnBrk="1" latinLnBrk="0" hangingPunct="1">
+    <a:lvl9pPr marL="3657600" algn="l" defTabSz="457200" rtl="0" eaLnBrk="1" latinLnBrk="0" hangingPunct="1">
       <a:defRPr sz="1800" kern="1200">
         <a:solidFill>
           <a:schemeClr val="tx1"/>
@@ -104,6 +104,11 @@
       </a:defRPr>
     </a:lvl9pPr>
   </p:defaultTextStyle>
+  <p:extLst>
+    <p:ext uri="{EFAFB233-063F-42B5-8137-9DF3F51BA10A}">
+      <p15:sldGuideLst xmlns:p15="http://schemas.microsoft.com/office/powerpoint/2012/main"/>
+    </p:ext>
+  </p:extLst>
 </p:presentation>
 </file>
 
@@ -126,13 +131,7 @@
       </p:grpSpPr>
       <p:sp>
         <p:nvSpPr>
-          <p:cNvPr id="2" name="Title 1">
-            <a:extLst>
-              <a:ext uri="{FF2B5EF4-FFF2-40B4-BE49-F238E27FC236}">
-                <a16:creationId xmlns:a16="http://schemas.microsoft.com/office/drawing/2014/main" id="{3E9B5BC5-4C09-426B-A4FC-5B71C7B070EA}"/>
-              </a:ext>
-            </a:extLst>
-          </p:cNvPr>
+          <p:cNvPr id="2" name="Title 1"/>
           <p:cNvSpPr>
             <a:spLocks noGrp="1"/>
           </p:cNvSpPr>
@@ -142,15 +141,15 @@
         </p:nvSpPr>
         <p:spPr>
           <a:xfrm>
-            <a:off x="1524000" y="1122363"/>
-            <a:ext cx="9144000" cy="2387600"/>
+            <a:off x="960120" y="1571308"/>
+            <a:ext cx="10881360" cy="3342640"/>
           </a:xfrm>
         </p:spPr>
         <p:txBody>
           <a:bodyPr anchor="b"/>
           <a:lstStyle>
             <a:lvl1pPr algn="ctr">
-              <a:defRPr sz="6000"/>
+              <a:defRPr sz="8400"/>
             </a:lvl1pPr>
           </a:lstStyle>
           <a:p>
@@ -158,19 +157,13 @@
               <a:rPr lang="en-US"/>
               <a:t>Click to edit Master title style</a:t>
             </a:r>
-            <a:endParaRPr lang="en-SG"/>
-          </a:p>
-        </p:txBody>
-      </p:sp>
-      <p:sp>
-        <p:nvSpPr>
-          <p:cNvPr id="3" name="Subtitle 2">
-            <a:extLst>
-              <a:ext uri="{FF2B5EF4-FFF2-40B4-BE49-F238E27FC236}">
-                <a16:creationId xmlns:a16="http://schemas.microsoft.com/office/drawing/2014/main" id="{B2B56340-7267-4860-9DCE-4DBC85C2FA0E}"/>
-              </a:ext>
-            </a:extLst>
-          </p:cNvPr>
+            <a:endParaRPr lang="en-US" dirty="0"/>
+          </a:p>
+        </p:txBody>
+      </p:sp>
+      <p:sp>
+        <p:nvSpPr>
+          <p:cNvPr id="3" name="Subtitle 2"/>
           <p:cNvSpPr>
             <a:spLocks noGrp="1"/>
           </p:cNvSpPr>
@@ -180,8 +173,8 @@
         </p:nvSpPr>
         <p:spPr>
           <a:xfrm>
-            <a:off x="1524000" y="3602038"/>
-            <a:ext cx="9144000" cy="1655762"/>
+            <a:off x="1600200" y="5042853"/>
+            <a:ext cx="9601200" cy="2318067"/>
           </a:xfrm>
         </p:spPr>
         <p:txBody>
@@ -189,39 +182,39 @@
           <a:lstStyle>
             <a:lvl1pPr marL="0" indent="0" algn="ctr">
               <a:buNone/>
-              <a:defRPr sz="2400"/>
+              <a:defRPr sz="3360"/>
             </a:lvl1pPr>
-            <a:lvl2pPr marL="457200" indent="0" algn="ctr">
-              <a:buNone/>
-              <a:defRPr sz="2000"/>
+            <a:lvl2pPr marL="640080" indent="0" algn="ctr">
+              <a:buNone/>
+              <a:defRPr sz="2800"/>
             </a:lvl2pPr>
-            <a:lvl3pPr marL="914400" indent="0" algn="ctr">
-              <a:buNone/>
-              <a:defRPr sz="1800"/>
+            <a:lvl3pPr marL="1280160" indent="0" algn="ctr">
+              <a:buNone/>
+              <a:defRPr sz="2520"/>
             </a:lvl3pPr>
-            <a:lvl4pPr marL="1371600" indent="0" algn="ctr">
-              <a:buNone/>
-              <a:defRPr sz="1600"/>
+            <a:lvl4pPr marL="1920240" indent="0" algn="ctr">
+              <a:buNone/>
+              <a:defRPr sz="2240"/>
             </a:lvl4pPr>
-            <a:lvl5pPr marL="1828800" indent="0" algn="ctr">
-              <a:buNone/>
-              <a:defRPr sz="1600"/>
+            <a:lvl5pPr marL="2560320" indent="0" algn="ctr">
+              <a:buNone/>
+              <a:defRPr sz="2240"/>
             </a:lvl5pPr>
-            <a:lvl6pPr marL="2286000" indent="0" algn="ctr">
-              <a:buNone/>
-              <a:defRPr sz="1600"/>
+            <a:lvl6pPr marL="3200400" indent="0" algn="ctr">
+              <a:buNone/>
+              <a:defRPr sz="2240"/>
             </a:lvl6pPr>
-            <a:lvl7pPr marL="2743200" indent="0" algn="ctr">
-              <a:buNone/>
-              <a:defRPr sz="1600"/>
+            <a:lvl7pPr marL="3840480" indent="0" algn="ctr">
+              <a:buNone/>
+              <a:defRPr sz="2240"/>
             </a:lvl7pPr>
-            <a:lvl8pPr marL="3200400" indent="0" algn="ctr">
-              <a:buNone/>
-              <a:defRPr sz="1600"/>
+            <a:lvl8pPr marL="4480560" indent="0" algn="ctr">
+              <a:buNone/>
+              <a:defRPr sz="2240"/>
             </a:lvl8pPr>
-            <a:lvl9pPr marL="3657600" indent="0" algn="ctr">
-              <a:buNone/>
-              <a:defRPr sz="1600"/>
+            <a:lvl9pPr marL="5120640" indent="0" algn="ctr">
+              <a:buNone/>
+              <a:defRPr sz="2240"/>
             </a:lvl9pPr>
           </a:lstStyle>
           <a:p>
@@ -229,19 +222,13 @@
               <a:rPr lang="en-US"/>
               <a:t>Click to edit Master subtitle style</a:t>
             </a:r>
-            <a:endParaRPr lang="en-SG"/>
-          </a:p>
-        </p:txBody>
-      </p:sp>
-      <p:sp>
-        <p:nvSpPr>
-          <p:cNvPr id="4" name="Date Placeholder 3">
-            <a:extLst>
-              <a:ext uri="{FF2B5EF4-FFF2-40B4-BE49-F238E27FC236}">
-                <a16:creationId xmlns:a16="http://schemas.microsoft.com/office/drawing/2014/main" id="{9C7AF334-C653-400C-B9E3-1C1E89ADD3E2}"/>
-              </a:ext>
-            </a:extLst>
-          </p:cNvPr>
+            <a:endParaRPr lang="en-US" dirty="0"/>
+          </a:p>
+        </p:txBody>
+      </p:sp>
+      <p:sp>
+        <p:nvSpPr>
+          <p:cNvPr id="4" name="Date Placeholder 3"/>
           <p:cNvSpPr>
             <a:spLocks noGrp="1"/>
           </p:cNvSpPr>
@@ -264,13 +251,7 @@
       </p:sp>
       <p:sp>
         <p:nvSpPr>
-          <p:cNvPr id="5" name="Footer Placeholder 4">
-            <a:extLst>
-              <a:ext uri="{FF2B5EF4-FFF2-40B4-BE49-F238E27FC236}">
-                <a16:creationId xmlns:a16="http://schemas.microsoft.com/office/drawing/2014/main" id="{D9B2FBEC-0BC9-4F1D-9A31-3E4EF1756ECA}"/>
-              </a:ext>
-            </a:extLst>
-          </p:cNvPr>
+          <p:cNvPr id="5" name="Footer Placeholder 4"/>
           <p:cNvSpPr>
             <a:spLocks noGrp="1"/>
           </p:cNvSpPr>
@@ -289,13 +270,7 @@
       </p:sp>
       <p:sp>
         <p:nvSpPr>
-          <p:cNvPr id="6" name="Slide Number Placeholder 5">
-            <a:extLst>
-              <a:ext uri="{FF2B5EF4-FFF2-40B4-BE49-F238E27FC236}">
-                <a16:creationId xmlns:a16="http://schemas.microsoft.com/office/drawing/2014/main" id="{152665A7-36FC-4734-AD9E-CD7D69A453AB}"/>
-              </a:ext>
-            </a:extLst>
-          </p:cNvPr>
+          <p:cNvPr id="6" name="Slide Number Placeholder 5"/>
           <p:cNvSpPr>
             <a:spLocks noGrp="1"/>
           </p:cNvSpPr>
@@ -319,7 +294,7 @@
     </p:spTree>
     <p:extLst>
       <p:ext uri="{BB962C8B-B14F-4D97-AF65-F5344CB8AC3E}">
-        <p14:creationId xmlns:p14="http://schemas.microsoft.com/office/powerpoint/2010/main" val="3182328837"/>
+        <p14:creationId xmlns:p14="http://schemas.microsoft.com/office/powerpoint/2010/main" val="4078228903"/>
       </p:ext>
     </p:extLst>
   </p:cSld>
@@ -348,13 +323,7 @@
       </p:grpSpPr>
       <p:sp>
         <p:nvSpPr>
-          <p:cNvPr id="2" name="Title 1">
-            <a:extLst>
-              <a:ext uri="{FF2B5EF4-FFF2-40B4-BE49-F238E27FC236}">
-                <a16:creationId xmlns:a16="http://schemas.microsoft.com/office/drawing/2014/main" id="{61F49C24-548F-4C0D-9569-6897A452B633}"/>
-              </a:ext>
-            </a:extLst>
-          </p:cNvPr>
+          <p:cNvPr id="2" name="Title 1"/>
           <p:cNvSpPr>
             <a:spLocks noGrp="1"/>
           </p:cNvSpPr>
@@ -371,19 +340,13 @@
               <a:rPr lang="en-US"/>
               <a:t>Click to edit Master title style</a:t>
             </a:r>
-            <a:endParaRPr lang="en-SG"/>
-          </a:p>
-        </p:txBody>
-      </p:sp>
-      <p:sp>
-        <p:nvSpPr>
-          <p:cNvPr id="3" name="Vertical Text Placeholder 2">
-            <a:extLst>
-              <a:ext uri="{FF2B5EF4-FFF2-40B4-BE49-F238E27FC236}">
-                <a16:creationId xmlns:a16="http://schemas.microsoft.com/office/drawing/2014/main" id="{FA8809C4-8D44-46F2-8990-B34DD358DF59}"/>
-              </a:ext>
-            </a:extLst>
-          </p:cNvPr>
+            <a:endParaRPr lang="en-US" dirty="0"/>
+          </a:p>
+        </p:txBody>
+      </p:sp>
+      <p:sp>
+        <p:nvSpPr>
+          <p:cNvPr id="3" name="Vertical Text Placeholder 2"/>
           <p:cNvSpPr>
             <a:spLocks noGrp="1"/>
           </p:cNvSpPr>
@@ -429,19 +392,13 @@
               <a:rPr lang="en-US"/>
               <a:t>Fifth level</a:t>
             </a:r>
-            <a:endParaRPr lang="en-SG"/>
-          </a:p>
-        </p:txBody>
-      </p:sp>
-      <p:sp>
-        <p:nvSpPr>
-          <p:cNvPr id="4" name="Date Placeholder 3">
-            <a:extLst>
-              <a:ext uri="{FF2B5EF4-FFF2-40B4-BE49-F238E27FC236}">
-                <a16:creationId xmlns:a16="http://schemas.microsoft.com/office/drawing/2014/main" id="{F3BE064D-8DBC-48C8-A010-B3E73F52A89B}"/>
-              </a:ext>
-            </a:extLst>
-          </p:cNvPr>
+            <a:endParaRPr lang="en-US" dirty="0"/>
+          </a:p>
+        </p:txBody>
+      </p:sp>
+      <p:sp>
+        <p:nvSpPr>
+          <p:cNvPr id="4" name="Date Placeholder 3"/>
           <p:cNvSpPr>
             <a:spLocks noGrp="1"/>
           </p:cNvSpPr>
@@ -464,13 +421,7 @@
       </p:sp>
       <p:sp>
         <p:nvSpPr>
-          <p:cNvPr id="5" name="Footer Placeholder 4">
-            <a:extLst>
-              <a:ext uri="{FF2B5EF4-FFF2-40B4-BE49-F238E27FC236}">
-                <a16:creationId xmlns:a16="http://schemas.microsoft.com/office/drawing/2014/main" id="{5B503917-7506-4522-95BF-B0E739809108}"/>
-              </a:ext>
-            </a:extLst>
-          </p:cNvPr>
+          <p:cNvPr id="5" name="Footer Placeholder 4"/>
           <p:cNvSpPr>
             <a:spLocks noGrp="1"/>
           </p:cNvSpPr>
@@ -489,13 +440,7 @@
       </p:sp>
       <p:sp>
         <p:nvSpPr>
-          <p:cNvPr id="6" name="Slide Number Placeholder 5">
-            <a:extLst>
-              <a:ext uri="{FF2B5EF4-FFF2-40B4-BE49-F238E27FC236}">
-                <a16:creationId xmlns:a16="http://schemas.microsoft.com/office/drawing/2014/main" id="{6D4E707C-8C91-4C6D-A3FA-E460E53C4B6D}"/>
-              </a:ext>
-            </a:extLst>
-          </p:cNvPr>
+          <p:cNvPr id="6" name="Slide Number Placeholder 5"/>
           <p:cNvSpPr>
             <a:spLocks noGrp="1"/>
           </p:cNvSpPr>
@@ -519,7 +464,7 @@
     </p:spTree>
     <p:extLst>
       <p:ext uri="{BB962C8B-B14F-4D97-AF65-F5344CB8AC3E}">
-        <p14:creationId xmlns:p14="http://schemas.microsoft.com/office/powerpoint/2010/main" val="3231205510"/>
+        <p14:creationId xmlns:p14="http://schemas.microsoft.com/office/powerpoint/2010/main" val="353904154"/>
       </p:ext>
     </p:extLst>
   </p:cSld>
@@ -548,13 +493,7 @@
       </p:grpSpPr>
       <p:sp>
         <p:nvSpPr>
-          <p:cNvPr id="2" name="Vertical Title 1">
-            <a:extLst>
-              <a:ext uri="{FF2B5EF4-FFF2-40B4-BE49-F238E27FC236}">
-                <a16:creationId xmlns:a16="http://schemas.microsoft.com/office/drawing/2014/main" id="{2D192772-5C6A-4D3A-82EC-01DF629BB166}"/>
-              </a:ext>
-            </a:extLst>
-          </p:cNvPr>
+          <p:cNvPr id="2" name="Vertical Title 1"/>
           <p:cNvSpPr>
             <a:spLocks noGrp="1"/>
           </p:cNvSpPr>
@@ -564,8 +503,8 @@
         </p:nvSpPr>
         <p:spPr>
           <a:xfrm>
-            <a:off x="8724900" y="365125"/>
-            <a:ext cx="2628900" cy="5811838"/>
+            <a:off x="9161146" y="511175"/>
+            <a:ext cx="2760345" cy="8136573"/>
           </a:xfrm>
         </p:spPr>
         <p:txBody>
@@ -576,19 +515,13 @@
               <a:rPr lang="en-US"/>
               <a:t>Click to edit Master title style</a:t>
             </a:r>
-            <a:endParaRPr lang="en-SG"/>
-          </a:p>
-        </p:txBody>
-      </p:sp>
-      <p:sp>
-        <p:nvSpPr>
-          <p:cNvPr id="3" name="Vertical Text Placeholder 2">
-            <a:extLst>
-              <a:ext uri="{FF2B5EF4-FFF2-40B4-BE49-F238E27FC236}">
-                <a16:creationId xmlns:a16="http://schemas.microsoft.com/office/drawing/2014/main" id="{2C5BAA66-0412-4E67-8173-DDC79654D64F}"/>
-              </a:ext>
-            </a:extLst>
-          </p:cNvPr>
+            <a:endParaRPr lang="en-US" dirty="0"/>
+          </a:p>
+        </p:txBody>
+      </p:sp>
+      <p:sp>
+        <p:nvSpPr>
+          <p:cNvPr id="3" name="Vertical Text Placeholder 2"/>
           <p:cNvSpPr>
             <a:spLocks noGrp="1"/>
           </p:cNvSpPr>
@@ -598,8 +531,8 @@
         </p:nvSpPr>
         <p:spPr>
           <a:xfrm>
-            <a:off x="838200" y="365125"/>
-            <a:ext cx="7734300" cy="5811838"/>
+            <a:off x="880111" y="511175"/>
+            <a:ext cx="8121015" cy="8136573"/>
           </a:xfrm>
         </p:spPr>
         <p:txBody>
@@ -639,19 +572,13 @@
               <a:rPr lang="en-US"/>
               <a:t>Fifth level</a:t>
             </a:r>
-            <a:endParaRPr lang="en-SG"/>
-          </a:p>
-        </p:txBody>
-      </p:sp>
-      <p:sp>
-        <p:nvSpPr>
-          <p:cNvPr id="4" name="Date Placeholder 3">
-            <a:extLst>
-              <a:ext uri="{FF2B5EF4-FFF2-40B4-BE49-F238E27FC236}">
-                <a16:creationId xmlns:a16="http://schemas.microsoft.com/office/drawing/2014/main" id="{ED02382A-E5FE-48B6-ADE5-0DBBE16AADD0}"/>
-              </a:ext>
-            </a:extLst>
-          </p:cNvPr>
+            <a:endParaRPr lang="en-US" dirty="0"/>
+          </a:p>
+        </p:txBody>
+      </p:sp>
+      <p:sp>
+        <p:nvSpPr>
+          <p:cNvPr id="4" name="Date Placeholder 3"/>
           <p:cNvSpPr>
             <a:spLocks noGrp="1"/>
           </p:cNvSpPr>
@@ -674,13 +601,7 @@
       </p:sp>
       <p:sp>
         <p:nvSpPr>
-          <p:cNvPr id="5" name="Footer Placeholder 4">
-            <a:extLst>
-              <a:ext uri="{FF2B5EF4-FFF2-40B4-BE49-F238E27FC236}">
-                <a16:creationId xmlns:a16="http://schemas.microsoft.com/office/drawing/2014/main" id="{52DB0268-0BD8-41B2-8D96-1F8247D067F1}"/>
-              </a:ext>
-            </a:extLst>
-          </p:cNvPr>
+          <p:cNvPr id="5" name="Footer Placeholder 4"/>
           <p:cNvSpPr>
             <a:spLocks noGrp="1"/>
           </p:cNvSpPr>
@@ -699,13 +620,7 @@
       </p:sp>
       <p:sp>
         <p:nvSpPr>
-          <p:cNvPr id="6" name="Slide Number Placeholder 5">
-            <a:extLst>
-              <a:ext uri="{FF2B5EF4-FFF2-40B4-BE49-F238E27FC236}">
-                <a16:creationId xmlns:a16="http://schemas.microsoft.com/office/drawing/2014/main" id="{145BCCBC-212B-441B-85F9-92138D561C9F}"/>
-              </a:ext>
-            </a:extLst>
-          </p:cNvPr>
+          <p:cNvPr id="6" name="Slide Number Placeholder 5"/>
           <p:cNvSpPr>
             <a:spLocks noGrp="1"/>
           </p:cNvSpPr>
@@ -729,7 +644,7 @@
     </p:spTree>
     <p:extLst>
       <p:ext uri="{BB962C8B-B14F-4D97-AF65-F5344CB8AC3E}">
-        <p14:creationId xmlns:p14="http://schemas.microsoft.com/office/powerpoint/2010/main" val="1205674476"/>
+        <p14:creationId xmlns:p14="http://schemas.microsoft.com/office/powerpoint/2010/main" val="3735111110"/>
       </p:ext>
     </p:extLst>
   </p:cSld>
@@ -758,13 +673,7 @@
       </p:grpSpPr>
       <p:sp>
         <p:nvSpPr>
-          <p:cNvPr id="2" name="Title 1">
-            <a:extLst>
-              <a:ext uri="{FF2B5EF4-FFF2-40B4-BE49-F238E27FC236}">
-                <a16:creationId xmlns:a16="http://schemas.microsoft.com/office/drawing/2014/main" id="{D663444A-8EA2-43E5-89D3-FA8D3E907A5B}"/>
-              </a:ext>
-            </a:extLst>
-          </p:cNvPr>
+          <p:cNvPr id="2" name="Title 1"/>
           <p:cNvSpPr>
             <a:spLocks noGrp="1"/>
           </p:cNvSpPr>
@@ -781,19 +690,13 @@
               <a:rPr lang="en-US"/>
               <a:t>Click to edit Master title style</a:t>
             </a:r>
-            <a:endParaRPr lang="en-SG"/>
-          </a:p>
-        </p:txBody>
-      </p:sp>
-      <p:sp>
-        <p:nvSpPr>
-          <p:cNvPr id="3" name="Content Placeholder 2">
-            <a:extLst>
-              <a:ext uri="{FF2B5EF4-FFF2-40B4-BE49-F238E27FC236}">
-                <a16:creationId xmlns:a16="http://schemas.microsoft.com/office/drawing/2014/main" id="{8B1B2F1B-CC5F-440A-BE20-ECFD88B06DB5}"/>
-              </a:ext>
-            </a:extLst>
-          </p:cNvPr>
+            <a:endParaRPr lang="en-US" dirty="0"/>
+          </a:p>
+        </p:txBody>
+      </p:sp>
+      <p:sp>
+        <p:nvSpPr>
+          <p:cNvPr id="3" name="Content Placeholder 2"/>
           <p:cNvSpPr>
             <a:spLocks noGrp="1"/>
           </p:cNvSpPr>
@@ -839,19 +742,13 @@
               <a:rPr lang="en-US"/>
               <a:t>Fifth level</a:t>
             </a:r>
-            <a:endParaRPr lang="en-SG"/>
-          </a:p>
-        </p:txBody>
-      </p:sp>
-      <p:sp>
-        <p:nvSpPr>
-          <p:cNvPr id="4" name="Date Placeholder 3">
-            <a:extLst>
-              <a:ext uri="{FF2B5EF4-FFF2-40B4-BE49-F238E27FC236}">
-                <a16:creationId xmlns:a16="http://schemas.microsoft.com/office/drawing/2014/main" id="{5AF6E5D4-D618-4C29-9400-63ACE8978666}"/>
-              </a:ext>
-            </a:extLst>
-          </p:cNvPr>
+            <a:endParaRPr lang="en-US" dirty="0"/>
+          </a:p>
+        </p:txBody>
+      </p:sp>
+      <p:sp>
+        <p:nvSpPr>
+          <p:cNvPr id="4" name="Date Placeholder 3"/>
           <p:cNvSpPr>
             <a:spLocks noGrp="1"/>
           </p:cNvSpPr>
@@ -874,13 +771,7 @@
       </p:sp>
       <p:sp>
         <p:nvSpPr>
-          <p:cNvPr id="5" name="Footer Placeholder 4">
-            <a:extLst>
-              <a:ext uri="{FF2B5EF4-FFF2-40B4-BE49-F238E27FC236}">
-                <a16:creationId xmlns:a16="http://schemas.microsoft.com/office/drawing/2014/main" id="{0A769847-4060-4E48-8033-178B3429F1CD}"/>
-              </a:ext>
-            </a:extLst>
-          </p:cNvPr>
+          <p:cNvPr id="5" name="Footer Placeholder 4"/>
           <p:cNvSpPr>
             <a:spLocks noGrp="1"/>
           </p:cNvSpPr>
@@ -899,13 +790,7 @@
       </p:sp>
       <p:sp>
         <p:nvSpPr>
-          <p:cNvPr id="6" name="Slide Number Placeholder 5">
-            <a:extLst>
-              <a:ext uri="{FF2B5EF4-FFF2-40B4-BE49-F238E27FC236}">
-                <a16:creationId xmlns:a16="http://schemas.microsoft.com/office/drawing/2014/main" id="{DF1F1BC6-7E20-4C83-8C82-E86709615933}"/>
-              </a:ext>
-            </a:extLst>
-          </p:cNvPr>
+          <p:cNvPr id="6" name="Slide Number Placeholder 5"/>
           <p:cNvSpPr>
             <a:spLocks noGrp="1"/>
           </p:cNvSpPr>
@@ -929,7 +814,7 @@
     </p:spTree>
     <p:extLst>
       <p:ext uri="{BB962C8B-B14F-4D97-AF65-F5344CB8AC3E}">
-        <p14:creationId xmlns:p14="http://schemas.microsoft.com/office/powerpoint/2010/main" val="2385472478"/>
+        <p14:creationId xmlns:p14="http://schemas.microsoft.com/office/powerpoint/2010/main" val="1872409851"/>
       </p:ext>
     </p:extLst>
   </p:cSld>
@@ -958,13 +843,7 @@
       </p:grpSpPr>
       <p:sp>
         <p:nvSpPr>
-          <p:cNvPr id="2" name="Title 1">
-            <a:extLst>
-              <a:ext uri="{FF2B5EF4-FFF2-40B4-BE49-F238E27FC236}">
-                <a16:creationId xmlns:a16="http://schemas.microsoft.com/office/drawing/2014/main" id="{CDD0F71B-004C-4EA3-A388-B47312B8365C}"/>
-              </a:ext>
-            </a:extLst>
-          </p:cNvPr>
+          <p:cNvPr id="2" name="Title 1"/>
           <p:cNvSpPr>
             <a:spLocks noGrp="1"/>
           </p:cNvSpPr>
@@ -974,15 +853,15 @@
         </p:nvSpPr>
         <p:spPr>
           <a:xfrm>
-            <a:off x="831850" y="1709738"/>
-            <a:ext cx="10515600" cy="2852737"/>
+            <a:off x="873443" y="2393635"/>
+            <a:ext cx="11041380" cy="3993832"/>
           </a:xfrm>
         </p:spPr>
         <p:txBody>
           <a:bodyPr anchor="b"/>
           <a:lstStyle>
             <a:lvl1pPr>
-              <a:defRPr sz="6000"/>
+              <a:defRPr sz="8400"/>
             </a:lvl1pPr>
           </a:lstStyle>
           <a:p>
@@ -990,19 +869,13 @@
               <a:rPr lang="en-US"/>
               <a:t>Click to edit Master title style</a:t>
             </a:r>
-            <a:endParaRPr lang="en-SG"/>
-          </a:p>
-        </p:txBody>
-      </p:sp>
-      <p:sp>
-        <p:nvSpPr>
-          <p:cNvPr id="3" name="Text Placeholder 2">
-            <a:extLst>
-              <a:ext uri="{FF2B5EF4-FFF2-40B4-BE49-F238E27FC236}">
-                <a16:creationId xmlns:a16="http://schemas.microsoft.com/office/drawing/2014/main" id="{36542C72-7A4B-4A8D-BDC1-9BE362D35FF1}"/>
-              </a:ext>
-            </a:extLst>
-          </p:cNvPr>
+            <a:endParaRPr lang="en-US" dirty="0"/>
+          </a:p>
+        </p:txBody>
+      </p:sp>
+      <p:sp>
+        <p:nvSpPr>
+          <p:cNvPr id="3" name="Text Placeholder 2"/>
           <p:cNvSpPr>
             <a:spLocks noGrp="1"/>
           </p:cNvSpPr>
@@ -1012,8 +885,8 @@
         </p:nvSpPr>
         <p:spPr>
           <a:xfrm>
-            <a:off x="831850" y="4589463"/>
-            <a:ext cx="10515600" cy="1500187"/>
+            <a:off x="873443" y="6425250"/>
+            <a:ext cx="11041380" cy="2100262"/>
           </a:xfrm>
         </p:spPr>
         <p:txBody>
@@ -1021,17 +894,15 @@
           <a:lstStyle>
             <a:lvl1pPr marL="0" indent="0">
               <a:buNone/>
-              <a:defRPr sz="2400">
+              <a:defRPr sz="3360">
                 <a:solidFill>
-                  <a:schemeClr val="tx1">
-                    <a:tint val="75000"/>
-                  </a:schemeClr>
+                  <a:schemeClr val="tx1"/>
                 </a:solidFill>
               </a:defRPr>
             </a:lvl1pPr>
-            <a:lvl2pPr marL="457200" indent="0">
-              <a:buNone/>
-              <a:defRPr sz="2000">
+            <a:lvl2pPr marL="640080" indent="0">
+              <a:buNone/>
+              <a:defRPr sz="2800">
                 <a:solidFill>
                   <a:schemeClr val="tx1">
                     <a:tint val="75000"/>
@@ -1039,9 +910,9 @@
                 </a:solidFill>
               </a:defRPr>
             </a:lvl2pPr>
-            <a:lvl3pPr marL="914400" indent="0">
-              <a:buNone/>
-              <a:defRPr sz="1800">
+            <a:lvl3pPr marL="1280160" indent="0">
+              <a:buNone/>
+              <a:defRPr sz="2520">
                 <a:solidFill>
                   <a:schemeClr val="tx1">
                     <a:tint val="75000"/>
@@ -1049,9 +920,9 @@
                 </a:solidFill>
               </a:defRPr>
             </a:lvl3pPr>
-            <a:lvl4pPr marL="1371600" indent="0">
-              <a:buNone/>
-              <a:defRPr sz="1600">
+            <a:lvl4pPr marL="1920240" indent="0">
+              <a:buNone/>
+              <a:defRPr sz="2240">
                 <a:solidFill>
                   <a:schemeClr val="tx1">
                     <a:tint val="75000"/>
@@ -1059,9 +930,9 @@
                 </a:solidFill>
               </a:defRPr>
             </a:lvl4pPr>
-            <a:lvl5pPr marL="1828800" indent="0">
-              <a:buNone/>
-              <a:defRPr sz="1600">
+            <a:lvl5pPr marL="2560320" indent="0">
+              <a:buNone/>
+              <a:defRPr sz="2240">
                 <a:solidFill>
                   <a:schemeClr val="tx1">
                     <a:tint val="75000"/>
@@ -1069,9 +940,9 @@
                 </a:solidFill>
               </a:defRPr>
             </a:lvl5pPr>
-            <a:lvl6pPr marL="2286000" indent="0">
-              <a:buNone/>
-              <a:defRPr sz="1600">
+            <a:lvl6pPr marL="3200400" indent="0">
+              <a:buNone/>
+              <a:defRPr sz="2240">
                 <a:solidFill>
                   <a:schemeClr val="tx1">
                     <a:tint val="75000"/>
@@ -1079,9 +950,9 @@
                 </a:solidFill>
               </a:defRPr>
             </a:lvl6pPr>
-            <a:lvl7pPr marL="2743200" indent="0">
-              <a:buNone/>
-              <a:defRPr sz="1600">
+            <a:lvl7pPr marL="3840480" indent="0">
+              <a:buNone/>
+              <a:defRPr sz="2240">
                 <a:solidFill>
                   <a:schemeClr val="tx1">
                     <a:tint val="75000"/>
@@ -1089,9 +960,9 @@
                 </a:solidFill>
               </a:defRPr>
             </a:lvl7pPr>
-            <a:lvl8pPr marL="3200400" indent="0">
-              <a:buNone/>
-              <a:defRPr sz="1600">
+            <a:lvl8pPr marL="4480560" indent="0">
+              <a:buNone/>
+              <a:defRPr sz="2240">
                 <a:solidFill>
                   <a:schemeClr val="tx1">
                     <a:tint val="75000"/>
@@ -1099,9 +970,9 @@
                 </a:solidFill>
               </a:defRPr>
             </a:lvl8pPr>
-            <a:lvl9pPr marL="3657600" indent="0">
-              <a:buNone/>
-              <a:defRPr sz="1600">
+            <a:lvl9pPr marL="5120640" indent="0">
+              <a:buNone/>
+              <a:defRPr sz="2240">
                 <a:solidFill>
                   <a:schemeClr val="tx1">
                     <a:tint val="75000"/>
@@ -1121,13 +992,7 @@
       </p:sp>
       <p:sp>
         <p:nvSpPr>
-          <p:cNvPr id="4" name="Date Placeholder 3">
-            <a:extLst>
-              <a:ext uri="{FF2B5EF4-FFF2-40B4-BE49-F238E27FC236}">
-                <a16:creationId xmlns:a16="http://schemas.microsoft.com/office/drawing/2014/main" id="{0D89801B-FC0E-4322-9052-C6D59F7027CB}"/>
-              </a:ext>
-            </a:extLst>
-          </p:cNvPr>
+          <p:cNvPr id="4" name="Date Placeholder 3"/>
           <p:cNvSpPr>
             <a:spLocks noGrp="1"/>
           </p:cNvSpPr>
@@ -1150,13 +1015,7 @@
       </p:sp>
       <p:sp>
         <p:nvSpPr>
-          <p:cNvPr id="5" name="Footer Placeholder 4">
-            <a:extLst>
-              <a:ext uri="{FF2B5EF4-FFF2-40B4-BE49-F238E27FC236}">
-                <a16:creationId xmlns:a16="http://schemas.microsoft.com/office/drawing/2014/main" id="{2D05629A-60F2-4FFE-8A90-86E01CCB4797}"/>
-              </a:ext>
-            </a:extLst>
-          </p:cNvPr>
+          <p:cNvPr id="5" name="Footer Placeholder 4"/>
           <p:cNvSpPr>
             <a:spLocks noGrp="1"/>
           </p:cNvSpPr>
@@ -1175,13 +1034,7 @@
       </p:sp>
       <p:sp>
         <p:nvSpPr>
-          <p:cNvPr id="6" name="Slide Number Placeholder 5">
-            <a:extLst>
-              <a:ext uri="{FF2B5EF4-FFF2-40B4-BE49-F238E27FC236}">
-                <a16:creationId xmlns:a16="http://schemas.microsoft.com/office/drawing/2014/main" id="{AE7A1D5F-43DF-4ADB-B454-E89F43BC3806}"/>
-              </a:ext>
-            </a:extLst>
-          </p:cNvPr>
+          <p:cNvPr id="6" name="Slide Number Placeholder 5"/>
           <p:cNvSpPr>
             <a:spLocks noGrp="1"/>
           </p:cNvSpPr>
@@ -1205,7 +1058,7 @@
     </p:spTree>
     <p:extLst>
       <p:ext uri="{BB962C8B-B14F-4D97-AF65-F5344CB8AC3E}">
-        <p14:creationId xmlns:p14="http://schemas.microsoft.com/office/powerpoint/2010/main" val="689188153"/>
+        <p14:creationId xmlns:p14="http://schemas.microsoft.com/office/powerpoint/2010/main" val="1136547463"/>
       </p:ext>
     </p:extLst>
   </p:cSld>
@@ -1234,13 +1087,7 @@
       </p:grpSpPr>
       <p:sp>
         <p:nvSpPr>
-          <p:cNvPr id="2" name="Title 1">
-            <a:extLst>
-              <a:ext uri="{FF2B5EF4-FFF2-40B4-BE49-F238E27FC236}">
-                <a16:creationId xmlns:a16="http://schemas.microsoft.com/office/drawing/2014/main" id="{065844D5-B9D4-4A4B-B13A-0AF9F9911693}"/>
-              </a:ext>
-            </a:extLst>
-          </p:cNvPr>
+          <p:cNvPr id="2" name="Title 1"/>
           <p:cNvSpPr>
             <a:spLocks noGrp="1"/>
           </p:cNvSpPr>
@@ -1257,19 +1104,13 @@
               <a:rPr lang="en-US"/>
               <a:t>Click to edit Master title style</a:t>
             </a:r>
-            <a:endParaRPr lang="en-SG"/>
-          </a:p>
-        </p:txBody>
-      </p:sp>
-      <p:sp>
-        <p:nvSpPr>
-          <p:cNvPr id="3" name="Content Placeholder 2">
-            <a:extLst>
-              <a:ext uri="{FF2B5EF4-FFF2-40B4-BE49-F238E27FC236}">
-                <a16:creationId xmlns:a16="http://schemas.microsoft.com/office/drawing/2014/main" id="{8D01C17F-B8E4-437F-8D56-66833BD15065}"/>
-              </a:ext>
-            </a:extLst>
-          </p:cNvPr>
+            <a:endParaRPr lang="en-US" dirty="0"/>
+          </a:p>
+        </p:txBody>
+      </p:sp>
+      <p:sp>
+        <p:nvSpPr>
+          <p:cNvPr id="3" name="Content Placeholder 2"/>
           <p:cNvSpPr>
             <a:spLocks noGrp="1"/>
           </p:cNvSpPr>
@@ -1279,8 +1120,8 @@
         </p:nvSpPr>
         <p:spPr>
           <a:xfrm>
-            <a:off x="838200" y="1825625"/>
-            <a:ext cx="5181600" cy="4351338"/>
+            <a:off x="880110" y="2555875"/>
+            <a:ext cx="5440680" cy="6091873"/>
           </a:xfrm>
         </p:spPr>
         <p:txBody>
@@ -1320,19 +1161,13 @@
               <a:rPr lang="en-US"/>
               <a:t>Fifth level</a:t>
             </a:r>
-            <a:endParaRPr lang="en-SG"/>
-          </a:p>
-        </p:txBody>
-      </p:sp>
-      <p:sp>
-        <p:nvSpPr>
-          <p:cNvPr id="4" name="Content Placeholder 3">
-            <a:extLst>
-              <a:ext uri="{FF2B5EF4-FFF2-40B4-BE49-F238E27FC236}">
-                <a16:creationId xmlns:a16="http://schemas.microsoft.com/office/drawing/2014/main" id="{8D081414-B361-477D-9043-5F6F9CBE2444}"/>
-              </a:ext>
-            </a:extLst>
-          </p:cNvPr>
+            <a:endParaRPr lang="en-US" dirty="0"/>
+          </a:p>
+        </p:txBody>
+      </p:sp>
+      <p:sp>
+        <p:nvSpPr>
+          <p:cNvPr id="4" name="Content Placeholder 3"/>
           <p:cNvSpPr>
             <a:spLocks noGrp="1"/>
           </p:cNvSpPr>
@@ -1342,8 +1177,8 @@
         </p:nvSpPr>
         <p:spPr>
           <a:xfrm>
-            <a:off x="6172200" y="1825625"/>
-            <a:ext cx="5181600" cy="4351338"/>
+            <a:off x="6480810" y="2555875"/>
+            <a:ext cx="5440680" cy="6091873"/>
           </a:xfrm>
         </p:spPr>
         <p:txBody>
@@ -1383,19 +1218,13 @@
               <a:rPr lang="en-US"/>
               <a:t>Fifth level</a:t>
             </a:r>
-            <a:endParaRPr lang="en-SG"/>
-          </a:p>
-        </p:txBody>
-      </p:sp>
-      <p:sp>
-        <p:nvSpPr>
-          <p:cNvPr id="5" name="Date Placeholder 4">
-            <a:extLst>
-              <a:ext uri="{FF2B5EF4-FFF2-40B4-BE49-F238E27FC236}">
-                <a16:creationId xmlns:a16="http://schemas.microsoft.com/office/drawing/2014/main" id="{829CEDF2-1D57-4EA4-B1E8-E2963CEC1C23}"/>
-              </a:ext>
-            </a:extLst>
-          </p:cNvPr>
+            <a:endParaRPr lang="en-US" dirty="0"/>
+          </a:p>
+        </p:txBody>
+      </p:sp>
+      <p:sp>
+        <p:nvSpPr>
+          <p:cNvPr id="5" name="Date Placeholder 4"/>
           <p:cNvSpPr>
             <a:spLocks noGrp="1"/>
           </p:cNvSpPr>
@@ -1418,13 +1247,7 @@
       </p:sp>
       <p:sp>
         <p:nvSpPr>
-          <p:cNvPr id="6" name="Footer Placeholder 5">
-            <a:extLst>
-              <a:ext uri="{FF2B5EF4-FFF2-40B4-BE49-F238E27FC236}">
-                <a16:creationId xmlns:a16="http://schemas.microsoft.com/office/drawing/2014/main" id="{37E4961F-B392-4E00-8B7D-38541023BA7F}"/>
-              </a:ext>
-            </a:extLst>
-          </p:cNvPr>
+          <p:cNvPr id="6" name="Footer Placeholder 5"/>
           <p:cNvSpPr>
             <a:spLocks noGrp="1"/>
           </p:cNvSpPr>
@@ -1443,13 +1266,7 @@
       </p:sp>
       <p:sp>
         <p:nvSpPr>
-          <p:cNvPr id="7" name="Slide Number Placeholder 6">
-            <a:extLst>
-              <a:ext uri="{FF2B5EF4-FFF2-40B4-BE49-F238E27FC236}">
-                <a16:creationId xmlns:a16="http://schemas.microsoft.com/office/drawing/2014/main" id="{756B355E-E852-40E2-94ED-8A8BE38C9E7E}"/>
-              </a:ext>
-            </a:extLst>
-          </p:cNvPr>
+          <p:cNvPr id="7" name="Slide Number Placeholder 6"/>
           <p:cNvSpPr>
             <a:spLocks noGrp="1"/>
           </p:cNvSpPr>
@@ -1473,7 +1290,7 @@
     </p:spTree>
     <p:extLst>
       <p:ext uri="{BB962C8B-B14F-4D97-AF65-F5344CB8AC3E}">
-        <p14:creationId xmlns:p14="http://schemas.microsoft.com/office/powerpoint/2010/main" val="2862016734"/>
+        <p14:creationId xmlns:p14="http://schemas.microsoft.com/office/powerpoint/2010/main" val="1570428969"/>
       </p:ext>
     </p:extLst>
   </p:cSld>
@@ -1502,13 +1319,7 @@
       </p:grpSpPr>
       <p:sp>
         <p:nvSpPr>
-          <p:cNvPr id="2" name="Title 1">
-            <a:extLst>
-              <a:ext uri="{FF2B5EF4-FFF2-40B4-BE49-F238E27FC236}">
-                <a16:creationId xmlns:a16="http://schemas.microsoft.com/office/drawing/2014/main" id="{59103ACA-9404-4724-804B-1061A0A159FF}"/>
-              </a:ext>
-            </a:extLst>
-          </p:cNvPr>
+          <p:cNvPr id="2" name="Title 1"/>
           <p:cNvSpPr>
             <a:spLocks noGrp="1"/>
           </p:cNvSpPr>
@@ -1518,8 +1329,8 @@
         </p:nvSpPr>
         <p:spPr>
           <a:xfrm>
-            <a:off x="839788" y="365125"/>
-            <a:ext cx="10515600" cy="1325563"/>
+            <a:off x="881777" y="511177"/>
+            <a:ext cx="11041380" cy="1855788"/>
           </a:xfrm>
         </p:spPr>
         <p:txBody>
@@ -1530,19 +1341,13 @@
               <a:rPr lang="en-US"/>
               <a:t>Click to edit Master title style</a:t>
             </a:r>
-            <a:endParaRPr lang="en-SG"/>
-          </a:p>
-        </p:txBody>
-      </p:sp>
-      <p:sp>
-        <p:nvSpPr>
-          <p:cNvPr id="3" name="Text Placeholder 2">
-            <a:extLst>
-              <a:ext uri="{FF2B5EF4-FFF2-40B4-BE49-F238E27FC236}">
-                <a16:creationId xmlns:a16="http://schemas.microsoft.com/office/drawing/2014/main" id="{A856F968-A9AD-4AA5-8D36-E86FC394DE7D}"/>
-              </a:ext>
-            </a:extLst>
-          </p:cNvPr>
+            <a:endParaRPr lang="en-US" dirty="0"/>
+          </a:p>
+        </p:txBody>
+      </p:sp>
+      <p:sp>
+        <p:nvSpPr>
+          <p:cNvPr id="3" name="Text Placeholder 2"/>
           <p:cNvSpPr>
             <a:spLocks noGrp="1"/>
           </p:cNvSpPr>
@@ -1552,8 +1357,8 @@
         </p:nvSpPr>
         <p:spPr>
           <a:xfrm>
-            <a:off x="839788" y="1681163"/>
-            <a:ext cx="5157787" cy="823912"/>
+            <a:off x="881779" y="2353628"/>
+            <a:ext cx="5415676" cy="1153477"/>
           </a:xfrm>
         </p:spPr>
         <p:txBody>
@@ -1561,39 +1366,39 @@
           <a:lstStyle>
             <a:lvl1pPr marL="0" indent="0">
               <a:buNone/>
-              <a:defRPr sz="2400" b="1"/>
+              <a:defRPr sz="3360" b="1"/>
             </a:lvl1pPr>
-            <a:lvl2pPr marL="457200" indent="0">
-              <a:buNone/>
-              <a:defRPr sz="2000" b="1"/>
+            <a:lvl2pPr marL="640080" indent="0">
+              <a:buNone/>
+              <a:defRPr sz="2800" b="1"/>
             </a:lvl2pPr>
-            <a:lvl3pPr marL="914400" indent="0">
-              <a:buNone/>
-              <a:defRPr sz="1800" b="1"/>
+            <a:lvl3pPr marL="1280160" indent="0">
+              <a:buNone/>
+              <a:defRPr sz="2520" b="1"/>
             </a:lvl3pPr>
-            <a:lvl4pPr marL="1371600" indent="0">
-              <a:buNone/>
-              <a:defRPr sz="1600" b="1"/>
+            <a:lvl4pPr marL="1920240" indent="0">
+              <a:buNone/>
+              <a:defRPr sz="2240" b="1"/>
             </a:lvl4pPr>
-            <a:lvl5pPr marL="1828800" indent="0">
-              <a:buNone/>
-              <a:defRPr sz="1600" b="1"/>
+            <a:lvl5pPr marL="2560320" indent="0">
+              <a:buNone/>
+              <a:defRPr sz="2240" b="1"/>
             </a:lvl5pPr>
-            <a:lvl6pPr marL="2286000" indent="0">
-              <a:buNone/>
-              <a:defRPr sz="1600" b="1"/>
+            <a:lvl6pPr marL="3200400" indent="0">
+              <a:buNone/>
+              <a:defRPr sz="2240" b="1"/>
             </a:lvl6pPr>
-            <a:lvl7pPr marL="2743200" indent="0">
-              <a:buNone/>
-              <a:defRPr sz="1600" b="1"/>
+            <a:lvl7pPr marL="3840480" indent="0">
+              <a:buNone/>
+              <a:defRPr sz="2240" b="1"/>
             </a:lvl7pPr>
-            <a:lvl8pPr marL="3200400" indent="0">
-              <a:buNone/>
-              <a:defRPr sz="1600" b="1"/>
+            <a:lvl8pPr marL="4480560" indent="0">
+              <a:buNone/>
+              <a:defRPr sz="2240" b="1"/>
             </a:lvl8pPr>
-            <a:lvl9pPr marL="3657600" indent="0">
-              <a:buNone/>
-              <a:defRPr sz="1600" b="1"/>
+            <a:lvl9pPr marL="5120640" indent="0">
+              <a:buNone/>
+              <a:defRPr sz="2240" b="1"/>
             </a:lvl9pPr>
           </a:lstStyle>
           <a:p>
@@ -1607,13 +1412,7 @@
       </p:sp>
       <p:sp>
         <p:nvSpPr>
-          <p:cNvPr id="4" name="Content Placeholder 3">
-            <a:extLst>
-              <a:ext uri="{FF2B5EF4-FFF2-40B4-BE49-F238E27FC236}">
-                <a16:creationId xmlns:a16="http://schemas.microsoft.com/office/drawing/2014/main" id="{FDF69B17-AA66-4BF2-B254-549010078354}"/>
-              </a:ext>
-            </a:extLst>
-          </p:cNvPr>
+          <p:cNvPr id="4" name="Content Placeholder 3"/>
           <p:cNvSpPr>
             <a:spLocks noGrp="1"/>
           </p:cNvSpPr>
@@ -1623,8 +1422,8 @@
         </p:nvSpPr>
         <p:spPr>
           <a:xfrm>
-            <a:off x="839788" y="2505075"/>
-            <a:ext cx="5157787" cy="3684588"/>
+            <a:off x="881779" y="3507105"/>
+            <a:ext cx="5415676" cy="5158423"/>
           </a:xfrm>
         </p:spPr>
         <p:txBody>
@@ -1664,19 +1463,13 @@
               <a:rPr lang="en-US"/>
               <a:t>Fifth level</a:t>
             </a:r>
-            <a:endParaRPr lang="en-SG"/>
-          </a:p>
-        </p:txBody>
-      </p:sp>
-      <p:sp>
-        <p:nvSpPr>
-          <p:cNvPr id="5" name="Text Placeholder 4">
-            <a:extLst>
-              <a:ext uri="{FF2B5EF4-FFF2-40B4-BE49-F238E27FC236}">
-                <a16:creationId xmlns:a16="http://schemas.microsoft.com/office/drawing/2014/main" id="{CD20E64B-B0AF-482E-BC1D-0F737FA2C5DC}"/>
-              </a:ext>
-            </a:extLst>
-          </p:cNvPr>
+            <a:endParaRPr lang="en-US" dirty="0"/>
+          </a:p>
+        </p:txBody>
+      </p:sp>
+      <p:sp>
+        <p:nvSpPr>
+          <p:cNvPr id="5" name="Text Placeholder 4"/>
           <p:cNvSpPr>
             <a:spLocks noGrp="1"/>
           </p:cNvSpPr>
@@ -1686,8 +1479,8 @@
         </p:nvSpPr>
         <p:spPr>
           <a:xfrm>
-            <a:off x="6172200" y="1681163"/>
-            <a:ext cx="5183188" cy="823912"/>
+            <a:off x="6480811" y="2353628"/>
+            <a:ext cx="5442347" cy="1153477"/>
           </a:xfrm>
         </p:spPr>
         <p:txBody>
@@ -1695,39 +1488,39 @@
           <a:lstStyle>
             <a:lvl1pPr marL="0" indent="0">
               <a:buNone/>
-              <a:defRPr sz="2400" b="1"/>
+              <a:defRPr sz="3360" b="1"/>
             </a:lvl1pPr>
-            <a:lvl2pPr marL="457200" indent="0">
-              <a:buNone/>
-              <a:defRPr sz="2000" b="1"/>
+            <a:lvl2pPr marL="640080" indent="0">
+              <a:buNone/>
+              <a:defRPr sz="2800" b="1"/>
             </a:lvl2pPr>
-            <a:lvl3pPr marL="914400" indent="0">
-              <a:buNone/>
-              <a:defRPr sz="1800" b="1"/>
+            <a:lvl3pPr marL="1280160" indent="0">
+              <a:buNone/>
+              <a:defRPr sz="2520" b="1"/>
             </a:lvl3pPr>
-            <a:lvl4pPr marL="1371600" indent="0">
-              <a:buNone/>
-              <a:defRPr sz="1600" b="1"/>
+            <a:lvl4pPr marL="1920240" indent="0">
+              <a:buNone/>
+              <a:defRPr sz="2240" b="1"/>
             </a:lvl4pPr>
-            <a:lvl5pPr marL="1828800" indent="0">
-              <a:buNone/>
-              <a:defRPr sz="1600" b="1"/>
+            <a:lvl5pPr marL="2560320" indent="0">
+              <a:buNone/>
+              <a:defRPr sz="2240" b="1"/>
             </a:lvl5pPr>
-            <a:lvl6pPr marL="2286000" indent="0">
-              <a:buNone/>
-              <a:defRPr sz="1600" b="1"/>
+            <a:lvl6pPr marL="3200400" indent="0">
+              <a:buNone/>
+              <a:defRPr sz="2240" b="1"/>
             </a:lvl6pPr>
-            <a:lvl7pPr marL="2743200" indent="0">
-              <a:buNone/>
-              <a:defRPr sz="1600" b="1"/>
+            <a:lvl7pPr marL="3840480" indent="0">
+              <a:buNone/>
+              <a:defRPr sz="2240" b="1"/>
             </a:lvl7pPr>
-            <a:lvl8pPr marL="3200400" indent="0">
-              <a:buNone/>
-              <a:defRPr sz="1600" b="1"/>
+            <a:lvl8pPr marL="4480560" indent="0">
+              <a:buNone/>
+              <a:defRPr sz="2240" b="1"/>
             </a:lvl8pPr>
-            <a:lvl9pPr marL="3657600" indent="0">
-              <a:buNone/>
-              <a:defRPr sz="1600" b="1"/>
+            <a:lvl9pPr marL="5120640" indent="0">
+              <a:buNone/>
+              <a:defRPr sz="2240" b="1"/>
             </a:lvl9pPr>
           </a:lstStyle>
           <a:p>
@@ -1741,13 +1534,7 @@
       </p:sp>
       <p:sp>
         <p:nvSpPr>
-          <p:cNvPr id="6" name="Content Placeholder 5">
-            <a:extLst>
-              <a:ext uri="{FF2B5EF4-FFF2-40B4-BE49-F238E27FC236}">
-                <a16:creationId xmlns:a16="http://schemas.microsoft.com/office/drawing/2014/main" id="{38ED2511-A235-43BF-83EA-AD92F9D4AEEE}"/>
-              </a:ext>
-            </a:extLst>
-          </p:cNvPr>
+          <p:cNvPr id="6" name="Content Placeholder 5"/>
           <p:cNvSpPr>
             <a:spLocks noGrp="1"/>
           </p:cNvSpPr>
@@ -1757,8 +1544,8 @@
         </p:nvSpPr>
         <p:spPr>
           <a:xfrm>
-            <a:off x="6172200" y="2505075"/>
-            <a:ext cx="5183188" cy="3684588"/>
+            <a:off x="6480811" y="3507105"/>
+            <a:ext cx="5442347" cy="5158423"/>
           </a:xfrm>
         </p:spPr>
         <p:txBody>
@@ -1798,19 +1585,13 @@
               <a:rPr lang="en-US"/>
               <a:t>Fifth level</a:t>
             </a:r>
-            <a:endParaRPr lang="en-SG"/>
-          </a:p>
-        </p:txBody>
-      </p:sp>
-      <p:sp>
-        <p:nvSpPr>
-          <p:cNvPr id="7" name="Date Placeholder 6">
-            <a:extLst>
-              <a:ext uri="{FF2B5EF4-FFF2-40B4-BE49-F238E27FC236}">
-                <a16:creationId xmlns:a16="http://schemas.microsoft.com/office/drawing/2014/main" id="{0204F98C-FAEC-49C1-BF54-419914155D8B}"/>
-              </a:ext>
-            </a:extLst>
-          </p:cNvPr>
+            <a:endParaRPr lang="en-US" dirty="0"/>
+          </a:p>
+        </p:txBody>
+      </p:sp>
+      <p:sp>
+        <p:nvSpPr>
+          <p:cNvPr id="7" name="Date Placeholder 6"/>
           <p:cNvSpPr>
             <a:spLocks noGrp="1"/>
           </p:cNvSpPr>
@@ -1833,13 +1614,7 @@
       </p:sp>
       <p:sp>
         <p:nvSpPr>
-          <p:cNvPr id="8" name="Footer Placeholder 7">
-            <a:extLst>
-              <a:ext uri="{FF2B5EF4-FFF2-40B4-BE49-F238E27FC236}">
-                <a16:creationId xmlns:a16="http://schemas.microsoft.com/office/drawing/2014/main" id="{364F4228-F55F-4E36-8C98-00F86BCAB44D}"/>
-              </a:ext>
-            </a:extLst>
-          </p:cNvPr>
+          <p:cNvPr id="8" name="Footer Placeholder 7"/>
           <p:cNvSpPr>
             <a:spLocks noGrp="1"/>
           </p:cNvSpPr>
@@ -1858,13 +1633,7 @@
       </p:sp>
       <p:sp>
         <p:nvSpPr>
-          <p:cNvPr id="9" name="Slide Number Placeholder 8">
-            <a:extLst>
-              <a:ext uri="{FF2B5EF4-FFF2-40B4-BE49-F238E27FC236}">
-                <a16:creationId xmlns:a16="http://schemas.microsoft.com/office/drawing/2014/main" id="{EFFFCBB8-B9C9-462F-B643-598308A1EBB9}"/>
-              </a:ext>
-            </a:extLst>
-          </p:cNvPr>
+          <p:cNvPr id="9" name="Slide Number Placeholder 8"/>
           <p:cNvSpPr>
             <a:spLocks noGrp="1"/>
           </p:cNvSpPr>
@@ -1888,7 +1657,7 @@
     </p:spTree>
     <p:extLst>
       <p:ext uri="{BB962C8B-B14F-4D97-AF65-F5344CB8AC3E}">
-        <p14:creationId xmlns:p14="http://schemas.microsoft.com/office/powerpoint/2010/main" val="1371768867"/>
+        <p14:creationId xmlns:p14="http://schemas.microsoft.com/office/powerpoint/2010/main" val="2194041319"/>
       </p:ext>
     </p:extLst>
   </p:cSld>
@@ -1917,13 +1686,7 @@
       </p:grpSpPr>
       <p:sp>
         <p:nvSpPr>
-          <p:cNvPr id="2" name="Title 1">
-            <a:extLst>
-              <a:ext uri="{FF2B5EF4-FFF2-40B4-BE49-F238E27FC236}">
-                <a16:creationId xmlns:a16="http://schemas.microsoft.com/office/drawing/2014/main" id="{83CA299D-642D-4F0E-8C75-5AEA5408FF56}"/>
-              </a:ext>
-            </a:extLst>
-          </p:cNvPr>
+          <p:cNvPr id="2" name="Title 1"/>
           <p:cNvSpPr>
             <a:spLocks noGrp="1"/>
           </p:cNvSpPr>
@@ -1940,19 +1703,13 @@
               <a:rPr lang="en-US"/>
               <a:t>Click to edit Master title style</a:t>
             </a:r>
-            <a:endParaRPr lang="en-SG"/>
-          </a:p>
-        </p:txBody>
-      </p:sp>
-      <p:sp>
-        <p:nvSpPr>
-          <p:cNvPr id="3" name="Date Placeholder 2">
-            <a:extLst>
-              <a:ext uri="{FF2B5EF4-FFF2-40B4-BE49-F238E27FC236}">
-                <a16:creationId xmlns:a16="http://schemas.microsoft.com/office/drawing/2014/main" id="{F42D44A7-867D-455A-80E8-4419361D5007}"/>
-              </a:ext>
-            </a:extLst>
-          </p:cNvPr>
+            <a:endParaRPr lang="en-US" dirty="0"/>
+          </a:p>
+        </p:txBody>
+      </p:sp>
+      <p:sp>
+        <p:nvSpPr>
+          <p:cNvPr id="3" name="Date Placeholder 2"/>
           <p:cNvSpPr>
             <a:spLocks noGrp="1"/>
           </p:cNvSpPr>
@@ -1975,13 +1732,7 @@
       </p:sp>
       <p:sp>
         <p:nvSpPr>
-          <p:cNvPr id="4" name="Footer Placeholder 3">
-            <a:extLst>
-              <a:ext uri="{FF2B5EF4-FFF2-40B4-BE49-F238E27FC236}">
-                <a16:creationId xmlns:a16="http://schemas.microsoft.com/office/drawing/2014/main" id="{A49B28B1-0290-4A65-9655-9425B2F8D60C}"/>
-              </a:ext>
-            </a:extLst>
-          </p:cNvPr>
+          <p:cNvPr id="4" name="Footer Placeholder 3"/>
           <p:cNvSpPr>
             <a:spLocks noGrp="1"/>
           </p:cNvSpPr>
@@ -2000,13 +1751,7 @@
       </p:sp>
       <p:sp>
         <p:nvSpPr>
-          <p:cNvPr id="5" name="Slide Number Placeholder 4">
-            <a:extLst>
-              <a:ext uri="{FF2B5EF4-FFF2-40B4-BE49-F238E27FC236}">
-                <a16:creationId xmlns:a16="http://schemas.microsoft.com/office/drawing/2014/main" id="{4DCAD226-3F14-41C5-BAD4-9986BE7E1B3C}"/>
-              </a:ext>
-            </a:extLst>
-          </p:cNvPr>
+          <p:cNvPr id="5" name="Slide Number Placeholder 4"/>
           <p:cNvSpPr>
             <a:spLocks noGrp="1"/>
           </p:cNvSpPr>
@@ -2030,7 +1775,7 @@
     </p:spTree>
     <p:extLst>
       <p:ext uri="{BB962C8B-B14F-4D97-AF65-F5344CB8AC3E}">
-        <p14:creationId xmlns:p14="http://schemas.microsoft.com/office/powerpoint/2010/main" val="1352709523"/>
+        <p14:creationId xmlns:p14="http://schemas.microsoft.com/office/powerpoint/2010/main" val="1546374253"/>
       </p:ext>
     </p:extLst>
   </p:cSld>
@@ -2059,13 +1804,7 @@
       </p:grpSpPr>
       <p:sp>
         <p:nvSpPr>
-          <p:cNvPr id="2" name="Date Placeholder 1">
-            <a:extLst>
-              <a:ext uri="{FF2B5EF4-FFF2-40B4-BE49-F238E27FC236}">
-                <a16:creationId xmlns:a16="http://schemas.microsoft.com/office/drawing/2014/main" id="{190DF8BD-CCAA-434B-8302-C9E2831C94FA}"/>
-              </a:ext>
-            </a:extLst>
-          </p:cNvPr>
+          <p:cNvPr id="2" name="Date Placeholder 1"/>
           <p:cNvSpPr>
             <a:spLocks noGrp="1"/>
           </p:cNvSpPr>
@@ -2088,13 +1827,7 @@
       </p:sp>
       <p:sp>
         <p:nvSpPr>
-          <p:cNvPr id="3" name="Footer Placeholder 2">
-            <a:extLst>
-              <a:ext uri="{FF2B5EF4-FFF2-40B4-BE49-F238E27FC236}">
-                <a16:creationId xmlns:a16="http://schemas.microsoft.com/office/drawing/2014/main" id="{605016C4-44D8-44BB-B46D-494210C1026E}"/>
-              </a:ext>
-            </a:extLst>
-          </p:cNvPr>
+          <p:cNvPr id="3" name="Footer Placeholder 2"/>
           <p:cNvSpPr>
             <a:spLocks noGrp="1"/>
           </p:cNvSpPr>
@@ -2113,13 +1846,7 @@
       </p:sp>
       <p:sp>
         <p:nvSpPr>
-          <p:cNvPr id="4" name="Slide Number Placeholder 3">
-            <a:extLst>
-              <a:ext uri="{FF2B5EF4-FFF2-40B4-BE49-F238E27FC236}">
-                <a16:creationId xmlns:a16="http://schemas.microsoft.com/office/drawing/2014/main" id="{854B1511-E9DC-4A2A-B71B-7AF3FE873B43}"/>
-              </a:ext>
-            </a:extLst>
-          </p:cNvPr>
+          <p:cNvPr id="4" name="Slide Number Placeholder 3"/>
           <p:cNvSpPr>
             <a:spLocks noGrp="1"/>
           </p:cNvSpPr>
@@ -2143,7 +1870,7 @@
     </p:spTree>
     <p:extLst>
       <p:ext uri="{BB962C8B-B14F-4D97-AF65-F5344CB8AC3E}">
-        <p14:creationId xmlns:p14="http://schemas.microsoft.com/office/powerpoint/2010/main" val="1145041766"/>
+        <p14:creationId xmlns:p14="http://schemas.microsoft.com/office/powerpoint/2010/main" val="813785565"/>
       </p:ext>
     </p:extLst>
   </p:cSld>
@@ -2172,13 +1899,7 @@
       </p:grpSpPr>
       <p:sp>
         <p:nvSpPr>
-          <p:cNvPr id="2" name="Title 1">
-            <a:extLst>
-              <a:ext uri="{FF2B5EF4-FFF2-40B4-BE49-F238E27FC236}">
-                <a16:creationId xmlns:a16="http://schemas.microsoft.com/office/drawing/2014/main" id="{46CC3B48-BF98-42EA-92FE-20E8651D25CE}"/>
-              </a:ext>
-            </a:extLst>
-          </p:cNvPr>
+          <p:cNvPr id="2" name="Title 1"/>
           <p:cNvSpPr>
             <a:spLocks noGrp="1"/>
           </p:cNvSpPr>
@@ -2188,15 +1909,15 @@
         </p:nvSpPr>
         <p:spPr>
           <a:xfrm>
-            <a:off x="839788" y="457200"/>
-            <a:ext cx="3932237" cy="1600200"/>
+            <a:off x="881778" y="640080"/>
+            <a:ext cx="4128849" cy="2240280"/>
           </a:xfrm>
         </p:spPr>
         <p:txBody>
           <a:bodyPr anchor="b"/>
           <a:lstStyle>
             <a:lvl1pPr>
-              <a:defRPr sz="3200"/>
+              <a:defRPr sz="4480"/>
             </a:lvl1pPr>
           </a:lstStyle>
           <a:p>
@@ -2204,19 +1925,13 @@
               <a:rPr lang="en-US"/>
               <a:t>Click to edit Master title style</a:t>
             </a:r>
-            <a:endParaRPr lang="en-SG"/>
-          </a:p>
-        </p:txBody>
-      </p:sp>
-      <p:sp>
-        <p:nvSpPr>
-          <p:cNvPr id="3" name="Content Placeholder 2">
-            <a:extLst>
-              <a:ext uri="{FF2B5EF4-FFF2-40B4-BE49-F238E27FC236}">
-                <a16:creationId xmlns:a16="http://schemas.microsoft.com/office/drawing/2014/main" id="{473FEEEC-E5D6-4128-99DE-17689DB5782B}"/>
-              </a:ext>
-            </a:extLst>
-          </p:cNvPr>
+            <a:endParaRPr lang="en-US" dirty="0"/>
+          </a:p>
+        </p:txBody>
+      </p:sp>
+      <p:sp>
+        <p:nvSpPr>
+          <p:cNvPr id="3" name="Content Placeholder 2"/>
           <p:cNvSpPr>
             <a:spLocks noGrp="1"/>
           </p:cNvSpPr>
@@ -2226,39 +1941,39 @@
         </p:nvSpPr>
         <p:spPr>
           <a:xfrm>
-            <a:off x="5183188" y="987425"/>
-            <a:ext cx="6172200" cy="4873625"/>
+            <a:off x="5442347" y="1382397"/>
+            <a:ext cx="6480810" cy="6823075"/>
           </a:xfrm>
         </p:spPr>
         <p:txBody>
           <a:bodyPr/>
           <a:lstStyle>
             <a:lvl1pPr>
-              <a:defRPr sz="3200"/>
+              <a:defRPr sz="4480"/>
             </a:lvl1pPr>
             <a:lvl2pPr>
-              <a:defRPr sz="2800"/>
+              <a:defRPr sz="3920"/>
             </a:lvl2pPr>
             <a:lvl3pPr>
-              <a:defRPr sz="2400"/>
+              <a:defRPr sz="3360"/>
             </a:lvl3pPr>
             <a:lvl4pPr>
-              <a:defRPr sz="2000"/>
+              <a:defRPr sz="2800"/>
             </a:lvl4pPr>
             <a:lvl5pPr>
-              <a:defRPr sz="2000"/>
+              <a:defRPr sz="2800"/>
             </a:lvl5pPr>
             <a:lvl6pPr>
-              <a:defRPr sz="2000"/>
+              <a:defRPr sz="2800"/>
             </a:lvl6pPr>
             <a:lvl7pPr>
-              <a:defRPr sz="2000"/>
+              <a:defRPr sz="2800"/>
             </a:lvl7pPr>
             <a:lvl8pPr>
-              <a:defRPr sz="2000"/>
+              <a:defRPr sz="2800"/>
             </a:lvl8pPr>
             <a:lvl9pPr>
-              <a:defRPr sz="2000"/>
+              <a:defRPr sz="2800"/>
             </a:lvl9pPr>
           </a:lstStyle>
           <a:p>
@@ -2295,19 +2010,13 @@
               <a:rPr lang="en-US"/>
               <a:t>Fifth level</a:t>
             </a:r>
-            <a:endParaRPr lang="en-SG"/>
-          </a:p>
-        </p:txBody>
-      </p:sp>
-      <p:sp>
-        <p:nvSpPr>
-          <p:cNvPr id="4" name="Text Placeholder 3">
-            <a:extLst>
-              <a:ext uri="{FF2B5EF4-FFF2-40B4-BE49-F238E27FC236}">
-                <a16:creationId xmlns:a16="http://schemas.microsoft.com/office/drawing/2014/main" id="{823552DE-6BAC-4134-A7B3-FF06F1194522}"/>
-              </a:ext>
-            </a:extLst>
-          </p:cNvPr>
+            <a:endParaRPr lang="en-US" dirty="0"/>
+          </a:p>
+        </p:txBody>
+      </p:sp>
+      <p:sp>
+        <p:nvSpPr>
+          <p:cNvPr id="4" name="Text Placeholder 3"/>
           <p:cNvSpPr>
             <a:spLocks noGrp="1"/>
           </p:cNvSpPr>
@@ -2317,8 +2026,8 @@
         </p:nvSpPr>
         <p:spPr>
           <a:xfrm>
-            <a:off x="839788" y="2057400"/>
-            <a:ext cx="3932237" cy="3811588"/>
+            <a:off x="881778" y="2880360"/>
+            <a:ext cx="4128849" cy="5336223"/>
           </a:xfrm>
         </p:spPr>
         <p:txBody>
@@ -2326,39 +2035,39 @@
           <a:lstStyle>
             <a:lvl1pPr marL="0" indent="0">
               <a:buNone/>
-              <a:defRPr sz="1600"/>
+              <a:defRPr sz="2240"/>
             </a:lvl1pPr>
-            <a:lvl2pPr marL="457200" indent="0">
+            <a:lvl2pPr marL="640080" indent="0">
+              <a:buNone/>
+              <a:defRPr sz="1960"/>
+            </a:lvl2pPr>
+            <a:lvl3pPr marL="1280160" indent="0">
+              <a:buNone/>
+              <a:defRPr sz="1680"/>
+            </a:lvl3pPr>
+            <a:lvl4pPr marL="1920240" indent="0">
               <a:buNone/>
               <a:defRPr sz="1400"/>
-            </a:lvl2pPr>
-            <a:lvl3pPr marL="914400" indent="0">
-              <a:buNone/>
-              <a:defRPr sz="1200"/>
-            </a:lvl3pPr>
-            <a:lvl4pPr marL="1371600" indent="0">
-              <a:buNone/>
-              <a:defRPr sz="1000"/>
             </a:lvl4pPr>
-            <a:lvl5pPr marL="1828800" indent="0">
-              <a:buNone/>
-              <a:defRPr sz="1000"/>
+            <a:lvl5pPr marL="2560320" indent="0">
+              <a:buNone/>
+              <a:defRPr sz="1400"/>
             </a:lvl5pPr>
-            <a:lvl6pPr marL="2286000" indent="0">
-              <a:buNone/>
-              <a:defRPr sz="1000"/>
+            <a:lvl6pPr marL="3200400" indent="0">
+              <a:buNone/>
+              <a:defRPr sz="1400"/>
             </a:lvl6pPr>
-            <a:lvl7pPr marL="2743200" indent="0">
-              <a:buNone/>
-              <a:defRPr sz="1000"/>
+            <a:lvl7pPr marL="3840480" indent="0">
+              <a:buNone/>
+              <a:defRPr sz="1400"/>
             </a:lvl7pPr>
-            <a:lvl8pPr marL="3200400" indent="0">
-              <a:buNone/>
-              <a:defRPr sz="1000"/>
+            <a:lvl8pPr marL="4480560" indent="0">
+              <a:buNone/>
+              <a:defRPr sz="1400"/>
             </a:lvl8pPr>
-            <a:lvl9pPr marL="3657600" indent="0">
-              <a:buNone/>
-              <a:defRPr sz="1000"/>
+            <a:lvl9pPr marL="5120640" indent="0">
+              <a:buNone/>
+              <a:defRPr sz="1400"/>
             </a:lvl9pPr>
           </a:lstStyle>
           <a:p>
@@ -2372,13 +2081,7 @@
       </p:sp>
       <p:sp>
         <p:nvSpPr>
-          <p:cNvPr id="5" name="Date Placeholder 4">
-            <a:extLst>
-              <a:ext uri="{FF2B5EF4-FFF2-40B4-BE49-F238E27FC236}">
-                <a16:creationId xmlns:a16="http://schemas.microsoft.com/office/drawing/2014/main" id="{9C943484-017C-4579-819F-7430B8FEE08B}"/>
-              </a:ext>
-            </a:extLst>
-          </p:cNvPr>
+          <p:cNvPr id="5" name="Date Placeholder 4"/>
           <p:cNvSpPr>
             <a:spLocks noGrp="1"/>
           </p:cNvSpPr>
@@ -2401,13 +2104,7 @@
       </p:sp>
       <p:sp>
         <p:nvSpPr>
-          <p:cNvPr id="6" name="Footer Placeholder 5">
-            <a:extLst>
-              <a:ext uri="{FF2B5EF4-FFF2-40B4-BE49-F238E27FC236}">
-                <a16:creationId xmlns:a16="http://schemas.microsoft.com/office/drawing/2014/main" id="{FCED1903-049A-4101-8C8E-57B6B2300FC2}"/>
-              </a:ext>
-            </a:extLst>
-          </p:cNvPr>
+          <p:cNvPr id="6" name="Footer Placeholder 5"/>
           <p:cNvSpPr>
             <a:spLocks noGrp="1"/>
           </p:cNvSpPr>
@@ -2426,13 +2123,7 @@
       </p:sp>
       <p:sp>
         <p:nvSpPr>
-          <p:cNvPr id="7" name="Slide Number Placeholder 6">
-            <a:extLst>
-              <a:ext uri="{FF2B5EF4-FFF2-40B4-BE49-F238E27FC236}">
-                <a16:creationId xmlns:a16="http://schemas.microsoft.com/office/drawing/2014/main" id="{FE238A94-F80F-4377-8D6E-07533F3AB1E5}"/>
-              </a:ext>
-            </a:extLst>
-          </p:cNvPr>
+          <p:cNvPr id="7" name="Slide Number Placeholder 6"/>
           <p:cNvSpPr>
             <a:spLocks noGrp="1"/>
           </p:cNvSpPr>
@@ -2456,7 +2147,7 @@
     </p:spTree>
     <p:extLst>
       <p:ext uri="{BB962C8B-B14F-4D97-AF65-F5344CB8AC3E}">
-        <p14:creationId xmlns:p14="http://schemas.microsoft.com/office/powerpoint/2010/main" val="3592338418"/>
+        <p14:creationId xmlns:p14="http://schemas.microsoft.com/office/powerpoint/2010/main" val="1132267124"/>
       </p:ext>
     </p:extLst>
   </p:cSld>
@@ -2485,13 +2176,7 @@
       </p:grpSpPr>
       <p:sp>
         <p:nvSpPr>
-          <p:cNvPr id="2" name="Title 1">
-            <a:extLst>
-              <a:ext uri="{FF2B5EF4-FFF2-40B4-BE49-F238E27FC236}">
-                <a16:creationId xmlns:a16="http://schemas.microsoft.com/office/drawing/2014/main" id="{B5E0D984-6892-4BC7-A21E-A50995A1CEE6}"/>
-              </a:ext>
-            </a:extLst>
-          </p:cNvPr>
+          <p:cNvPr id="2" name="Title 1"/>
           <p:cNvSpPr>
             <a:spLocks noGrp="1"/>
           </p:cNvSpPr>
@@ -2501,15 +2186,15 @@
         </p:nvSpPr>
         <p:spPr>
           <a:xfrm>
-            <a:off x="839788" y="457200"/>
-            <a:ext cx="3932237" cy="1600200"/>
+            <a:off x="881778" y="640080"/>
+            <a:ext cx="4128849" cy="2240280"/>
           </a:xfrm>
         </p:spPr>
         <p:txBody>
           <a:bodyPr anchor="b"/>
           <a:lstStyle>
             <a:lvl1pPr>
-              <a:defRPr sz="3200"/>
+              <a:defRPr sz="4480"/>
             </a:lvl1pPr>
           </a:lstStyle>
           <a:p>
@@ -2517,21 +2202,15 @@
               <a:rPr lang="en-US"/>
               <a:t>Click to edit Master title style</a:t>
             </a:r>
-            <a:endParaRPr lang="en-SG"/>
-          </a:p>
-        </p:txBody>
-      </p:sp>
-      <p:sp>
-        <p:nvSpPr>
-          <p:cNvPr id="3" name="Picture Placeholder 2">
-            <a:extLst>
-              <a:ext uri="{FF2B5EF4-FFF2-40B4-BE49-F238E27FC236}">
-                <a16:creationId xmlns:a16="http://schemas.microsoft.com/office/drawing/2014/main" id="{0E4A81EA-883B-4A63-AEBD-8F500AD08300}"/>
-              </a:ext>
-            </a:extLst>
-          </p:cNvPr>
-          <p:cNvSpPr>
-            <a:spLocks noGrp="1"/>
+            <a:endParaRPr lang="en-US" dirty="0"/>
+          </a:p>
+        </p:txBody>
+      </p:sp>
+      <p:sp>
+        <p:nvSpPr>
+          <p:cNvPr id="3" name="Picture Placeholder 2"/>
+          <p:cNvSpPr>
+            <a:spLocks noGrp="1" noChangeAspect="1"/>
           </p:cNvSpPr>
           <p:nvPr>
             <p:ph type="pic" idx="1"/>
@@ -2539,8 +2218,73 @@
         </p:nvSpPr>
         <p:spPr>
           <a:xfrm>
-            <a:off x="5183188" y="987425"/>
-            <a:ext cx="6172200" cy="4873625"/>
+            <a:off x="5442347" y="1382397"/>
+            <a:ext cx="6480810" cy="6823075"/>
+          </a:xfrm>
+        </p:spPr>
+        <p:txBody>
+          <a:bodyPr anchor="t"/>
+          <a:lstStyle>
+            <a:lvl1pPr marL="0" indent="0">
+              <a:buNone/>
+              <a:defRPr sz="4480"/>
+            </a:lvl1pPr>
+            <a:lvl2pPr marL="640080" indent="0">
+              <a:buNone/>
+              <a:defRPr sz="3920"/>
+            </a:lvl2pPr>
+            <a:lvl3pPr marL="1280160" indent="0">
+              <a:buNone/>
+              <a:defRPr sz="3360"/>
+            </a:lvl3pPr>
+            <a:lvl4pPr marL="1920240" indent="0">
+              <a:buNone/>
+              <a:defRPr sz="2800"/>
+            </a:lvl4pPr>
+            <a:lvl5pPr marL="2560320" indent="0">
+              <a:buNone/>
+              <a:defRPr sz="2800"/>
+            </a:lvl5pPr>
+            <a:lvl6pPr marL="3200400" indent="0">
+              <a:buNone/>
+              <a:defRPr sz="2800"/>
+            </a:lvl6pPr>
+            <a:lvl7pPr marL="3840480" indent="0">
+              <a:buNone/>
+              <a:defRPr sz="2800"/>
+            </a:lvl7pPr>
+            <a:lvl8pPr marL="4480560" indent="0">
+              <a:buNone/>
+              <a:defRPr sz="2800"/>
+            </a:lvl8pPr>
+            <a:lvl9pPr marL="5120640" indent="0">
+              <a:buNone/>
+              <a:defRPr sz="2800"/>
+            </a:lvl9pPr>
+          </a:lstStyle>
+          <a:p>
+            <a:r>
+              <a:rPr lang="en-US"/>
+              <a:t>Click icon to add picture</a:t>
+            </a:r>
+            <a:endParaRPr lang="en-US" dirty="0"/>
+          </a:p>
+        </p:txBody>
+      </p:sp>
+      <p:sp>
+        <p:nvSpPr>
+          <p:cNvPr id="4" name="Text Placeholder 3"/>
+          <p:cNvSpPr>
+            <a:spLocks noGrp="1"/>
+          </p:cNvSpPr>
+          <p:nvPr>
+            <p:ph type="body" sz="half" idx="2"/>
+          </p:nvPr>
+        </p:nvSpPr>
+        <p:spPr>
+          <a:xfrm>
+            <a:off x="881778" y="2880360"/>
+            <a:ext cx="4128849" cy="5336223"/>
           </a:xfrm>
         </p:spPr>
         <p:txBody>
@@ -2548,109 +2292,42 @@
           <a:lstStyle>
             <a:lvl1pPr marL="0" indent="0">
               <a:buNone/>
-              <a:defRPr sz="3200"/>
+              <a:defRPr sz="2240"/>
             </a:lvl1pPr>
-            <a:lvl2pPr marL="457200" indent="0">
-              <a:buNone/>
-              <a:defRPr sz="2800"/>
+            <a:lvl2pPr marL="640080" indent="0">
+              <a:buNone/>
+              <a:defRPr sz="1960"/>
             </a:lvl2pPr>
-            <a:lvl3pPr marL="914400" indent="0">
-              <a:buNone/>
-              <a:defRPr sz="2400"/>
+            <a:lvl3pPr marL="1280160" indent="0">
+              <a:buNone/>
+              <a:defRPr sz="1680"/>
             </a:lvl3pPr>
-            <a:lvl4pPr marL="1371600" indent="0">
-              <a:buNone/>
-              <a:defRPr sz="2000"/>
+            <a:lvl4pPr marL="1920240" indent="0">
+              <a:buNone/>
+              <a:defRPr sz="1400"/>
             </a:lvl4pPr>
-            <a:lvl5pPr marL="1828800" indent="0">
-              <a:buNone/>
-              <a:defRPr sz="2000"/>
+            <a:lvl5pPr marL="2560320" indent="0">
+              <a:buNone/>
+              <a:defRPr sz="1400"/>
             </a:lvl5pPr>
-            <a:lvl6pPr marL="2286000" indent="0">
-              <a:buNone/>
-              <a:defRPr sz="2000"/>
+            <a:lvl6pPr marL="3200400" indent="0">
+              <a:buNone/>
+              <a:defRPr sz="1400"/>
             </a:lvl6pPr>
-            <a:lvl7pPr marL="2743200" indent="0">
-              <a:buNone/>
-              <a:defRPr sz="2000"/>
+            <a:lvl7pPr marL="3840480" indent="0">
+              <a:buNone/>
+              <a:defRPr sz="1400"/>
             </a:lvl7pPr>
-            <a:lvl8pPr marL="3200400" indent="0">
-              <a:buNone/>
-              <a:defRPr sz="2000"/>
+            <a:lvl8pPr marL="4480560" indent="0">
+              <a:buNone/>
+              <a:defRPr sz="1400"/>
             </a:lvl8pPr>
-            <a:lvl9pPr marL="3657600" indent="0">
-              <a:buNone/>
-              <a:defRPr sz="2000"/>
+            <a:lvl9pPr marL="5120640" indent="0">
+              <a:buNone/>
+              <a:defRPr sz="1400"/>
             </a:lvl9pPr>
           </a:lstStyle>
           <a:p>
-            <a:endParaRPr lang="en-SG"/>
-          </a:p>
-        </p:txBody>
-      </p:sp>
-      <p:sp>
-        <p:nvSpPr>
-          <p:cNvPr id="4" name="Text Placeholder 3">
-            <a:extLst>
-              <a:ext uri="{FF2B5EF4-FFF2-40B4-BE49-F238E27FC236}">
-                <a16:creationId xmlns:a16="http://schemas.microsoft.com/office/drawing/2014/main" id="{010096EA-AB45-426A-B1F7-8FD0934BB3B8}"/>
-              </a:ext>
-            </a:extLst>
-          </p:cNvPr>
-          <p:cNvSpPr>
-            <a:spLocks noGrp="1"/>
-          </p:cNvSpPr>
-          <p:nvPr>
-            <p:ph type="body" sz="half" idx="2"/>
-          </p:nvPr>
-        </p:nvSpPr>
-        <p:spPr>
-          <a:xfrm>
-            <a:off x="839788" y="2057400"/>
-            <a:ext cx="3932237" cy="3811588"/>
-          </a:xfrm>
-        </p:spPr>
-        <p:txBody>
-          <a:bodyPr/>
-          <a:lstStyle>
-            <a:lvl1pPr marL="0" indent="0">
-              <a:buNone/>
-              <a:defRPr sz="1600"/>
-            </a:lvl1pPr>
-            <a:lvl2pPr marL="457200" indent="0">
-              <a:buNone/>
-              <a:defRPr sz="1400"/>
-            </a:lvl2pPr>
-            <a:lvl3pPr marL="914400" indent="0">
-              <a:buNone/>
-              <a:defRPr sz="1200"/>
-            </a:lvl3pPr>
-            <a:lvl4pPr marL="1371600" indent="0">
-              <a:buNone/>
-              <a:defRPr sz="1000"/>
-            </a:lvl4pPr>
-            <a:lvl5pPr marL="1828800" indent="0">
-              <a:buNone/>
-              <a:defRPr sz="1000"/>
-            </a:lvl5pPr>
-            <a:lvl6pPr marL="2286000" indent="0">
-              <a:buNone/>
-              <a:defRPr sz="1000"/>
-            </a:lvl6pPr>
-            <a:lvl7pPr marL="2743200" indent="0">
-              <a:buNone/>
-              <a:defRPr sz="1000"/>
-            </a:lvl7pPr>
-            <a:lvl8pPr marL="3200400" indent="0">
-              <a:buNone/>
-              <a:defRPr sz="1000"/>
-            </a:lvl8pPr>
-            <a:lvl9pPr marL="3657600" indent="0">
-              <a:buNone/>
-              <a:defRPr sz="1000"/>
-            </a:lvl9pPr>
-          </a:lstStyle>
-          <a:p>
             <a:pPr lvl="0"/>
             <a:r>
               <a:rPr lang="en-US"/>
@@ -2661,13 +2338,7 @@
       </p:sp>
       <p:sp>
         <p:nvSpPr>
-          <p:cNvPr id="5" name="Date Placeholder 4">
-            <a:extLst>
-              <a:ext uri="{FF2B5EF4-FFF2-40B4-BE49-F238E27FC236}">
-                <a16:creationId xmlns:a16="http://schemas.microsoft.com/office/drawing/2014/main" id="{EA1E61C7-6C85-49BE-8AB9-87A355A10A0E}"/>
-              </a:ext>
-            </a:extLst>
-          </p:cNvPr>
+          <p:cNvPr id="5" name="Date Placeholder 4"/>
           <p:cNvSpPr>
             <a:spLocks noGrp="1"/>
           </p:cNvSpPr>
@@ -2690,13 +2361,7 @@
       </p:sp>
       <p:sp>
         <p:nvSpPr>
-          <p:cNvPr id="6" name="Footer Placeholder 5">
-            <a:extLst>
-              <a:ext uri="{FF2B5EF4-FFF2-40B4-BE49-F238E27FC236}">
-                <a16:creationId xmlns:a16="http://schemas.microsoft.com/office/drawing/2014/main" id="{18605D5F-4532-4734-97E9-5304592DEB9E}"/>
-              </a:ext>
-            </a:extLst>
-          </p:cNvPr>
+          <p:cNvPr id="6" name="Footer Placeholder 5"/>
           <p:cNvSpPr>
             <a:spLocks noGrp="1"/>
           </p:cNvSpPr>
@@ -2715,13 +2380,7 @@
       </p:sp>
       <p:sp>
         <p:nvSpPr>
-          <p:cNvPr id="7" name="Slide Number Placeholder 6">
-            <a:extLst>
-              <a:ext uri="{FF2B5EF4-FFF2-40B4-BE49-F238E27FC236}">
-                <a16:creationId xmlns:a16="http://schemas.microsoft.com/office/drawing/2014/main" id="{1FF044F9-9A32-4850-947D-78BBA2D57452}"/>
-              </a:ext>
-            </a:extLst>
-          </p:cNvPr>
+          <p:cNvPr id="7" name="Slide Number Placeholder 6"/>
           <p:cNvSpPr>
             <a:spLocks noGrp="1"/>
           </p:cNvSpPr>
@@ -2745,7 +2404,7 @@
     </p:spTree>
     <p:extLst>
       <p:ext uri="{BB962C8B-B14F-4D97-AF65-F5344CB8AC3E}">
-        <p14:creationId xmlns:p14="http://schemas.microsoft.com/office/powerpoint/2010/main" val="2487861412"/>
+        <p14:creationId xmlns:p14="http://schemas.microsoft.com/office/powerpoint/2010/main" val="3133677520"/>
       </p:ext>
     </p:extLst>
   </p:cSld>
@@ -2779,13 +2438,7 @@
       </p:grpSpPr>
       <p:sp>
         <p:nvSpPr>
-          <p:cNvPr id="2" name="Title Placeholder 1">
-            <a:extLst>
-              <a:ext uri="{FF2B5EF4-FFF2-40B4-BE49-F238E27FC236}">
-                <a16:creationId xmlns:a16="http://schemas.microsoft.com/office/drawing/2014/main" id="{0B8AC811-0F43-4D95-845F-2C9323D436BA}"/>
-              </a:ext>
-            </a:extLst>
-          </p:cNvPr>
+          <p:cNvPr id="2" name="Title Placeholder 1"/>
           <p:cNvSpPr>
             <a:spLocks noGrp="1"/>
           </p:cNvSpPr>
@@ -2795,8 +2448,8 @@
         </p:nvSpPr>
         <p:spPr>
           <a:xfrm>
-            <a:off x="838200" y="365125"/>
-            <a:ext cx="10515600" cy="1325563"/>
+            <a:off x="880110" y="511177"/>
+            <a:ext cx="11041380" cy="1855788"/>
           </a:xfrm>
           <a:prstGeom prst="rect">
             <a:avLst/>
@@ -2812,19 +2465,13 @@
               <a:rPr lang="en-US"/>
               <a:t>Click to edit Master title style</a:t>
             </a:r>
-            <a:endParaRPr lang="en-SG"/>
-          </a:p>
-        </p:txBody>
-      </p:sp>
-      <p:sp>
-        <p:nvSpPr>
-          <p:cNvPr id="3" name="Text Placeholder 2">
-            <a:extLst>
-              <a:ext uri="{FF2B5EF4-FFF2-40B4-BE49-F238E27FC236}">
-                <a16:creationId xmlns:a16="http://schemas.microsoft.com/office/drawing/2014/main" id="{D309A750-6A08-4820-B0EA-1E617840A1FE}"/>
-              </a:ext>
-            </a:extLst>
-          </p:cNvPr>
+            <a:endParaRPr lang="en-US" dirty="0"/>
+          </a:p>
+        </p:txBody>
+      </p:sp>
+      <p:sp>
+        <p:nvSpPr>
+          <p:cNvPr id="3" name="Text Placeholder 2"/>
           <p:cNvSpPr>
             <a:spLocks noGrp="1"/>
           </p:cNvSpPr>
@@ -2834,8 +2481,8 @@
         </p:nvSpPr>
         <p:spPr>
           <a:xfrm>
-            <a:off x="838200" y="1825625"/>
-            <a:ext cx="10515600" cy="4351338"/>
+            <a:off x="880110" y="2555875"/>
+            <a:ext cx="11041380" cy="6091873"/>
           </a:xfrm>
           <a:prstGeom prst="rect">
             <a:avLst/>
@@ -2880,19 +2527,13 @@
               <a:rPr lang="en-US"/>
               <a:t>Fifth level</a:t>
             </a:r>
-            <a:endParaRPr lang="en-SG"/>
-          </a:p>
-        </p:txBody>
-      </p:sp>
-      <p:sp>
-        <p:nvSpPr>
-          <p:cNvPr id="4" name="Date Placeholder 3">
-            <a:extLst>
-              <a:ext uri="{FF2B5EF4-FFF2-40B4-BE49-F238E27FC236}">
-                <a16:creationId xmlns:a16="http://schemas.microsoft.com/office/drawing/2014/main" id="{DF559909-242B-48E6-87F2-7A16C0B4A32F}"/>
-              </a:ext>
-            </a:extLst>
-          </p:cNvPr>
+            <a:endParaRPr lang="en-US" dirty="0"/>
+          </a:p>
+        </p:txBody>
+      </p:sp>
+      <p:sp>
+        <p:nvSpPr>
+          <p:cNvPr id="4" name="Date Placeholder 3"/>
           <p:cNvSpPr>
             <a:spLocks noGrp="1"/>
           </p:cNvSpPr>
@@ -2902,8 +2543,8 @@
         </p:nvSpPr>
         <p:spPr>
           <a:xfrm>
-            <a:off x="838200" y="6356350"/>
-            <a:ext cx="2743200" cy="365125"/>
+            <a:off x="880110" y="8898892"/>
+            <a:ext cx="2880360" cy="511175"/>
           </a:xfrm>
           <a:prstGeom prst="rect">
             <a:avLst/>
@@ -2913,7 +2554,7 @@
           <a:bodyPr vert="horz" lIns="91440" tIns="45720" rIns="91440" bIns="45720" rtlCol="0" anchor="ctr"/>
           <a:lstStyle>
             <a:lvl1pPr algn="l">
-              <a:defRPr sz="1200">
+              <a:defRPr sz="1680">
                 <a:solidFill>
                   <a:schemeClr val="tx1">
                     <a:tint val="75000"/>
@@ -2933,13 +2574,7 @@
       </p:sp>
       <p:sp>
         <p:nvSpPr>
-          <p:cNvPr id="5" name="Footer Placeholder 4">
-            <a:extLst>
-              <a:ext uri="{FF2B5EF4-FFF2-40B4-BE49-F238E27FC236}">
-                <a16:creationId xmlns:a16="http://schemas.microsoft.com/office/drawing/2014/main" id="{D1AE0026-1E8D-43D4-A331-2E4586219C2D}"/>
-              </a:ext>
-            </a:extLst>
-          </p:cNvPr>
+          <p:cNvPr id="5" name="Footer Placeholder 4"/>
           <p:cNvSpPr>
             <a:spLocks noGrp="1"/>
           </p:cNvSpPr>
@@ -2949,8 +2584,8 @@
         </p:nvSpPr>
         <p:spPr>
           <a:xfrm>
-            <a:off x="4038600" y="6356350"/>
-            <a:ext cx="4114800" cy="365125"/>
+            <a:off x="4240530" y="8898892"/>
+            <a:ext cx="4320540" cy="511175"/>
           </a:xfrm>
           <a:prstGeom prst="rect">
             <a:avLst/>
@@ -2960,7 +2595,7 @@
           <a:bodyPr vert="horz" lIns="91440" tIns="45720" rIns="91440" bIns="45720" rtlCol="0" anchor="ctr"/>
           <a:lstStyle>
             <a:lvl1pPr algn="ctr">
-              <a:defRPr sz="1200">
+              <a:defRPr sz="1680">
                 <a:solidFill>
                   <a:schemeClr val="tx1">
                     <a:tint val="75000"/>
@@ -2976,13 +2611,7 @@
       </p:sp>
       <p:sp>
         <p:nvSpPr>
-          <p:cNvPr id="6" name="Slide Number Placeholder 5">
-            <a:extLst>
-              <a:ext uri="{FF2B5EF4-FFF2-40B4-BE49-F238E27FC236}">
-                <a16:creationId xmlns:a16="http://schemas.microsoft.com/office/drawing/2014/main" id="{7C49BAED-4F73-43EB-A1F0-2AB1E9F22C80}"/>
-              </a:ext>
-            </a:extLst>
-          </p:cNvPr>
+          <p:cNvPr id="6" name="Slide Number Placeholder 5"/>
           <p:cNvSpPr>
             <a:spLocks noGrp="1"/>
           </p:cNvSpPr>
@@ -2992,8 +2621,8 @@
         </p:nvSpPr>
         <p:spPr>
           <a:xfrm>
-            <a:off x="8610600" y="6356350"/>
-            <a:ext cx="2743200" cy="365125"/>
+            <a:off x="9041130" y="8898892"/>
+            <a:ext cx="2880360" cy="511175"/>
           </a:xfrm>
           <a:prstGeom prst="rect">
             <a:avLst/>
@@ -3003,7 +2632,7 @@
           <a:bodyPr vert="horz" lIns="91440" tIns="45720" rIns="91440" bIns="45720" rtlCol="0" anchor="ctr"/>
           <a:lstStyle>
             <a:lvl1pPr algn="r">
-              <a:defRPr sz="1200">
+              <a:defRPr sz="1680">
                 <a:solidFill>
                   <a:schemeClr val="tx1">
                     <a:tint val="75000"/>
@@ -3024,27 +2653,27 @@
     </p:spTree>
     <p:extLst>
       <p:ext uri="{BB962C8B-B14F-4D97-AF65-F5344CB8AC3E}">
-        <p14:creationId xmlns:p14="http://schemas.microsoft.com/office/powerpoint/2010/main" val="2699931208"/>
+        <p14:creationId xmlns:p14="http://schemas.microsoft.com/office/powerpoint/2010/main" val="3100389720"/>
       </p:ext>
     </p:extLst>
   </p:cSld>
   <p:clrMap bg1="lt1" tx1="dk1" bg2="lt2" tx2="dk2" accent1="accent1" accent2="accent2" accent3="accent3" accent4="accent4" accent5="accent5" accent6="accent6" hlink="hlink" folHlink="folHlink"/>
   <p:sldLayoutIdLst>
-    <p:sldLayoutId id="2147483649" r:id="rId1"/>
-    <p:sldLayoutId id="2147483650" r:id="rId2"/>
-    <p:sldLayoutId id="2147483651" r:id="rId3"/>
-    <p:sldLayoutId id="2147483652" r:id="rId4"/>
-    <p:sldLayoutId id="2147483653" r:id="rId5"/>
-    <p:sldLayoutId id="2147483654" r:id="rId6"/>
-    <p:sldLayoutId id="2147483655" r:id="rId7"/>
-    <p:sldLayoutId id="2147483656" r:id="rId8"/>
-    <p:sldLayoutId id="2147483657" r:id="rId9"/>
-    <p:sldLayoutId id="2147483658" r:id="rId10"/>
-    <p:sldLayoutId id="2147483659" r:id="rId11"/>
+    <p:sldLayoutId id="2147483661" r:id="rId1"/>
+    <p:sldLayoutId id="2147483662" r:id="rId2"/>
+    <p:sldLayoutId id="2147483663" r:id="rId3"/>
+    <p:sldLayoutId id="2147483664" r:id="rId4"/>
+    <p:sldLayoutId id="2147483665" r:id="rId5"/>
+    <p:sldLayoutId id="2147483666" r:id="rId6"/>
+    <p:sldLayoutId id="2147483667" r:id="rId7"/>
+    <p:sldLayoutId id="2147483668" r:id="rId8"/>
+    <p:sldLayoutId id="2147483669" r:id="rId9"/>
+    <p:sldLayoutId id="2147483670" r:id="rId10"/>
+    <p:sldLayoutId id="2147483671" r:id="rId11"/>
   </p:sldLayoutIdLst>
   <p:txStyles>
     <p:titleStyle>
-      <a:lvl1pPr algn="l" defTabSz="914400" rtl="0" eaLnBrk="1" latinLnBrk="0" hangingPunct="1">
+      <a:lvl1pPr algn="l" defTabSz="1280160" rtl="0" eaLnBrk="1" latinLnBrk="0" hangingPunct="1">
         <a:lnSpc>
           <a:spcPct val="90000"/>
         </a:lnSpc>
@@ -3052,7 +2681,7 @@
           <a:spcPct val="0"/>
         </a:spcBef>
         <a:buNone/>
-        <a:defRPr sz="4400" kern="1200">
+        <a:defRPr sz="6160" kern="1200">
           <a:solidFill>
             <a:schemeClr val="tx1"/>
           </a:solidFill>
@@ -3063,12 +2692,48 @@
       </a:lvl1pPr>
     </p:titleStyle>
     <p:bodyStyle>
-      <a:lvl1pPr marL="228600" indent="-228600" algn="l" defTabSz="914400" rtl="0" eaLnBrk="1" latinLnBrk="0" hangingPunct="1">
+      <a:lvl1pPr marL="320040" indent="-320040" algn="l" defTabSz="1280160" rtl="0" eaLnBrk="1" latinLnBrk="0" hangingPunct="1">
         <a:lnSpc>
           <a:spcPct val="90000"/>
         </a:lnSpc>
         <a:spcBef>
-          <a:spcPts val="1000"/>
+          <a:spcPts val="1400"/>
+        </a:spcBef>
+        <a:buFont typeface="Arial" panose="020B0604020202020204" pitchFamily="34" charset="0"/>
+        <a:buChar char="•"/>
+        <a:defRPr sz="3920" kern="1200">
+          <a:solidFill>
+            <a:schemeClr val="tx1"/>
+          </a:solidFill>
+          <a:latin typeface="+mn-lt"/>
+          <a:ea typeface="+mn-ea"/>
+          <a:cs typeface="+mn-cs"/>
+        </a:defRPr>
+      </a:lvl1pPr>
+      <a:lvl2pPr marL="960120" indent="-320040" algn="l" defTabSz="1280160" rtl="0" eaLnBrk="1" latinLnBrk="0" hangingPunct="1">
+        <a:lnSpc>
+          <a:spcPct val="90000"/>
+        </a:lnSpc>
+        <a:spcBef>
+          <a:spcPts val="700"/>
+        </a:spcBef>
+        <a:buFont typeface="Arial" panose="020B0604020202020204" pitchFamily="34" charset="0"/>
+        <a:buChar char="•"/>
+        <a:defRPr sz="3360" kern="1200">
+          <a:solidFill>
+            <a:schemeClr val="tx1"/>
+          </a:solidFill>
+          <a:latin typeface="+mn-lt"/>
+          <a:ea typeface="+mn-ea"/>
+          <a:cs typeface="+mn-cs"/>
+        </a:defRPr>
+      </a:lvl2pPr>
+      <a:lvl3pPr marL="1600200" indent="-320040" algn="l" defTabSz="1280160" rtl="0" eaLnBrk="1" latinLnBrk="0" hangingPunct="1">
+        <a:lnSpc>
+          <a:spcPct val="90000"/>
+        </a:lnSpc>
+        <a:spcBef>
+          <a:spcPts val="700"/>
         </a:spcBef>
         <a:buFont typeface="Arial" panose="020B0604020202020204" pitchFamily="34" charset="0"/>
         <a:buChar char="•"/>
@@ -3080,53 +2745,17 @@
           <a:ea typeface="+mn-ea"/>
           <a:cs typeface="+mn-cs"/>
         </a:defRPr>
-      </a:lvl1pPr>
-      <a:lvl2pPr marL="685800" indent="-228600" algn="l" defTabSz="914400" rtl="0" eaLnBrk="1" latinLnBrk="0" hangingPunct="1">
+      </a:lvl3pPr>
+      <a:lvl4pPr marL="2240280" indent="-320040" algn="l" defTabSz="1280160" rtl="0" eaLnBrk="1" latinLnBrk="0" hangingPunct="1">
         <a:lnSpc>
           <a:spcPct val="90000"/>
         </a:lnSpc>
         <a:spcBef>
-          <a:spcPts val="500"/>
+          <a:spcPts val="700"/>
         </a:spcBef>
         <a:buFont typeface="Arial" panose="020B0604020202020204" pitchFamily="34" charset="0"/>
         <a:buChar char="•"/>
-        <a:defRPr sz="2400" kern="1200">
-          <a:solidFill>
-            <a:schemeClr val="tx1"/>
-          </a:solidFill>
-          <a:latin typeface="+mn-lt"/>
-          <a:ea typeface="+mn-ea"/>
-          <a:cs typeface="+mn-cs"/>
-        </a:defRPr>
-      </a:lvl2pPr>
-      <a:lvl3pPr marL="1143000" indent="-228600" algn="l" defTabSz="914400" rtl="0" eaLnBrk="1" latinLnBrk="0" hangingPunct="1">
-        <a:lnSpc>
-          <a:spcPct val="90000"/>
-        </a:lnSpc>
-        <a:spcBef>
-          <a:spcPts val="500"/>
-        </a:spcBef>
-        <a:buFont typeface="Arial" panose="020B0604020202020204" pitchFamily="34" charset="0"/>
-        <a:buChar char="•"/>
-        <a:defRPr sz="2000" kern="1200">
-          <a:solidFill>
-            <a:schemeClr val="tx1"/>
-          </a:solidFill>
-          <a:latin typeface="+mn-lt"/>
-          <a:ea typeface="+mn-ea"/>
-          <a:cs typeface="+mn-cs"/>
-        </a:defRPr>
-      </a:lvl3pPr>
-      <a:lvl4pPr marL="1600200" indent="-228600" algn="l" defTabSz="914400" rtl="0" eaLnBrk="1" latinLnBrk="0" hangingPunct="1">
-        <a:lnSpc>
-          <a:spcPct val="90000"/>
-        </a:lnSpc>
-        <a:spcBef>
-          <a:spcPts val="500"/>
-        </a:spcBef>
-        <a:buFont typeface="Arial" panose="020B0604020202020204" pitchFamily="34" charset="0"/>
-        <a:buChar char="•"/>
-        <a:defRPr sz="1800" kern="1200">
+        <a:defRPr sz="2520" kern="1200">
           <a:solidFill>
             <a:schemeClr val="tx1"/>
           </a:solidFill>
@@ -3135,16 +2764,16 @@
           <a:cs typeface="+mn-cs"/>
         </a:defRPr>
       </a:lvl4pPr>
-      <a:lvl5pPr marL="2057400" indent="-228600" algn="l" defTabSz="914400" rtl="0" eaLnBrk="1" latinLnBrk="0" hangingPunct="1">
+      <a:lvl5pPr marL="2880360" indent="-320040" algn="l" defTabSz="1280160" rtl="0" eaLnBrk="1" latinLnBrk="0" hangingPunct="1">
         <a:lnSpc>
           <a:spcPct val="90000"/>
         </a:lnSpc>
         <a:spcBef>
-          <a:spcPts val="500"/>
+          <a:spcPts val="700"/>
         </a:spcBef>
         <a:buFont typeface="Arial" panose="020B0604020202020204" pitchFamily="34" charset="0"/>
         <a:buChar char="•"/>
-        <a:defRPr sz="1800" kern="1200">
+        <a:defRPr sz="2520" kern="1200">
           <a:solidFill>
             <a:schemeClr val="tx1"/>
           </a:solidFill>
@@ -3153,16 +2782,16 @@
           <a:cs typeface="+mn-cs"/>
         </a:defRPr>
       </a:lvl5pPr>
-      <a:lvl6pPr marL="2514600" indent="-228600" algn="l" defTabSz="914400" rtl="0" eaLnBrk="1" latinLnBrk="0" hangingPunct="1">
+      <a:lvl6pPr marL="3520440" indent="-320040" algn="l" defTabSz="1280160" rtl="0" eaLnBrk="1" latinLnBrk="0" hangingPunct="1">
         <a:lnSpc>
           <a:spcPct val="90000"/>
         </a:lnSpc>
         <a:spcBef>
-          <a:spcPts val="500"/>
+          <a:spcPts val="700"/>
         </a:spcBef>
         <a:buFont typeface="Arial" panose="020B0604020202020204" pitchFamily="34" charset="0"/>
         <a:buChar char="•"/>
-        <a:defRPr sz="1800" kern="1200">
+        <a:defRPr sz="2520" kern="1200">
           <a:solidFill>
             <a:schemeClr val="tx1"/>
           </a:solidFill>
@@ -3171,16 +2800,16 @@
           <a:cs typeface="+mn-cs"/>
         </a:defRPr>
       </a:lvl6pPr>
-      <a:lvl7pPr marL="2971800" indent="-228600" algn="l" defTabSz="914400" rtl="0" eaLnBrk="1" latinLnBrk="0" hangingPunct="1">
+      <a:lvl7pPr marL="4160520" indent="-320040" algn="l" defTabSz="1280160" rtl="0" eaLnBrk="1" latinLnBrk="0" hangingPunct="1">
         <a:lnSpc>
           <a:spcPct val="90000"/>
         </a:lnSpc>
         <a:spcBef>
-          <a:spcPts val="500"/>
+          <a:spcPts val="700"/>
         </a:spcBef>
         <a:buFont typeface="Arial" panose="020B0604020202020204" pitchFamily="34" charset="0"/>
         <a:buChar char="•"/>
-        <a:defRPr sz="1800" kern="1200">
+        <a:defRPr sz="2520" kern="1200">
           <a:solidFill>
             <a:schemeClr val="tx1"/>
           </a:solidFill>
@@ -3189,16 +2818,16 @@
           <a:cs typeface="+mn-cs"/>
         </a:defRPr>
       </a:lvl7pPr>
-      <a:lvl8pPr marL="3429000" indent="-228600" algn="l" defTabSz="914400" rtl="0" eaLnBrk="1" latinLnBrk="0" hangingPunct="1">
+      <a:lvl8pPr marL="4800600" indent="-320040" algn="l" defTabSz="1280160" rtl="0" eaLnBrk="1" latinLnBrk="0" hangingPunct="1">
         <a:lnSpc>
           <a:spcPct val="90000"/>
         </a:lnSpc>
         <a:spcBef>
-          <a:spcPts val="500"/>
+          <a:spcPts val="700"/>
         </a:spcBef>
         <a:buFont typeface="Arial" panose="020B0604020202020204" pitchFamily="34" charset="0"/>
         <a:buChar char="•"/>
-        <a:defRPr sz="1800" kern="1200">
+        <a:defRPr sz="2520" kern="1200">
           <a:solidFill>
             <a:schemeClr val="tx1"/>
           </a:solidFill>
@@ -3207,16 +2836,16 @@
           <a:cs typeface="+mn-cs"/>
         </a:defRPr>
       </a:lvl8pPr>
-      <a:lvl9pPr marL="3886200" indent="-228600" algn="l" defTabSz="914400" rtl="0" eaLnBrk="1" latinLnBrk="0" hangingPunct="1">
+      <a:lvl9pPr marL="5440680" indent="-320040" algn="l" defTabSz="1280160" rtl="0" eaLnBrk="1" latinLnBrk="0" hangingPunct="1">
         <a:lnSpc>
           <a:spcPct val="90000"/>
         </a:lnSpc>
         <a:spcBef>
-          <a:spcPts val="500"/>
+          <a:spcPts val="700"/>
         </a:spcBef>
         <a:buFont typeface="Arial" panose="020B0604020202020204" pitchFamily="34" charset="0"/>
         <a:buChar char="•"/>
-        <a:defRPr sz="1800" kern="1200">
+        <a:defRPr sz="2520" kern="1200">
           <a:solidFill>
             <a:schemeClr val="tx1"/>
           </a:solidFill>
@@ -3230,8 +2859,8 @@
       <a:defPPr>
         <a:defRPr lang="en-US"/>
       </a:defPPr>
-      <a:lvl1pPr marL="0" algn="l" defTabSz="914400" rtl="0" eaLnBrk="1" latinLnBrk="0" hangingPunct="1">
-        <a:defRPr sz="1800" kern="1200">
+      <a:lvl1pPr marL="0" algn="l" defTabSz="1280160" rtl="0" eaLnBrk="1" latinLnBrk="0" hangingPunct="1">
+        <a:defRPr sz="2520" kern="1200">
           <a:solidFill>
             <a:schemeClr val="tx1"/>
           </a:solidFill>
@@ -3240,8 +2869,8 @@
           <a:cs typeface="+mn-cs"/>
         </a:defRPr>
       </a:lvl1pPr>
-      <a:lvl2pPr marL="457200" algn="l" defTabSz="914400" rtl="0" eaLnBrk="1" latinLnBrk="0" hangingPunct="1">
-        <a:defRPr sz="1800" kern="1200">
+      <a:lvl2pPr marL="640080" algn="l" defTabSz="1280160" rtl="0" eaLnBrk="1" latinLnBrk="0" hangingPunct="1">
+        <a:defRPr sz="2520" kern="1200">
           <a:solidFill>
             <a:schemeClr val="tx1"/>
           </a:solidFill>
@@ -3250,8 +2879,8 @@
           <a:cs typeface="+mn-cs"/>
         </a:defRPr>
       </a:lvl2pPr>
-      <a:lvl3pPr marL="914400" algn="l" defTabSz="914400" rtl="0" eaLnBrk="1" latinLnBrk="0" hangingPunct="1">
-        <a:defRPr sz="1800" kern="1200">
+      <a:lvl3pPr marL="1280160" algn="l" defTabSz="1280160" rtl="0" eaLnBrk="1" latinLnBrk="0" hangingPunct="1">
+        <a:defRPr sz="2520" kern="1200">
           <a:solidFill>
             <a:schemeClr val="tx1"/>
           </a:solidFill>
@@ -3260,8 +2889,8 @@
           <a:cs typeface="+mn-cs"/>
         </a:defRPr>
       </a:lvl3pPr>
-      <a:lvl4pPr marL="1371600" algn="l" defTabSz="914400" rtl="0" eaLnBrk="1" latinLnBrk="0" hangingPunct="1">
-        <a:defRPr sz="1800" kern="1200">
+      <a:lvl4pPr marL="1920240" algn="l" defTabSz="1280160" rtl="0" eaLnBrk="1" latinLnBrk="0" hangingPunct="1">
+        <a:defRPr sz="2520" kern="1200">
           <a:solidFill>
             <a:schemeClr val="tx1"/>
           </a:solidFill>
@@ -3270,8 +2899,8 @@
           <a:cs typeface="+mn-cs"/>
         </a:defRPr>
       </a:lvl4pPr>
-      <a:lvl5pPr marL="1828800" algn="l" defTabSz="914400" rtl="0" eaLnBrk="1" latinLnBrk="0" hangingPunct="1">
-        <a:defRPr sz="1800" kern="1200">
+      <a:lvl5pPr marL="2560320" algn="l" defTabSz="1280160" rtl="0" eaLnBrk="1" latinLnBrk="0" hangingPunct="1">
+        <a:defRPr sz="2520" kern="1200">
           <a:solidFill>
             <a:schemeClr val="tx1"/>
           </a:solidFill>
@@ -3280,8 +2909,8 @@
           <a:cs typeface="+mn-cs"/>
         </a:defRPr>
       </a:lvl5pPr>
-      <a:lvl6pPr marL="2286000" algn="l" defTabSz="914400" rtl="0" eaLnBrk="1" latinLnBrk="0" hangingPunct="1">
-        <a:defRPr sz="1800" kern="1200">
+      <a:lvl6pPr marL="3200400" algn="l" defTabSz="1280160" rtl="0" eaLnBrk="1" latinLnBrk="0" hangingPunct="1">
+        <a:defRPr sz="2520" kern="1200">
           <a:solidFill>
             <a:schemeClr val="tx1"/>
           </a:solidFill>
@@ -3290,8 +2919,8 @@
           <a:cs typeface="+mn-cs"/>
         </a:defRPr>
       </a:lvl6pPr>
-      <a:lvl7pPr marL="2743200" algn="l" defTabSz="914400" rtl="0" eaLnBrk="1" latinLnBrk="0" hangingPunct="1">
-        <a:defRPr sz="1800" kern="1200">
+      <a:lvl7pPr marL="3840480" algn="l" defTabSz="1280160" rtl="0" eaLnBrk="1" latinLnBrk="0" hangingPunct="1">
+        <a:defRPr sz="2520" kern="1200">
           <a:solidFill>
             <a:schemeClr val="tx1"/>
           </a:solidFill>
@@ -3300,8 +2929,8 @@
           <a:cs typeface="+mn-cs"/>
         </a:defRPr>
       </a:lvl7pPr>
-      <a:lvl8pPr marL="3200400" algn="l" defTabSz="914400" rtl="0" eaLnBrk="1" latinLnBrk="0" hangingPunct="1">
-        <a:defRPr sz="1800" kern="1200">
+      <a:lvl8pPr marL="4480560" algn="l" defTabSz="1280160" rtl="0" eaLnBrk="1" latinLnBrk="0" hangingPunct="1">
+        <a:defRPr sz="2520" kern="1200">
           <a:solidFill>
             <a:schemeClr val="tx1"/>
           </a:solidFill>
@@ -3310,8 +2939,8 @@
           <a:cs typeface="+mn-cs"/>
         </a:defRPr>
       </a:lvl8pPr>
-      <a:lvl9pPr marL="3657600" algn="l" defTabSz="914400" rtl="0" eaLnBrk="1" latinLnBrk="0" hangingPunct="1">
-        <a:defRPr sz="1800" kern="1200">
+      <a:lvl9pPr marL="5120640" algn="l" defTabSz="1280160" rtl="0" eaLnBrk="1" latinLnBrk="0" hangingPunct="1">
+        <a:defRPr sz="2520" kern="1200">
           <a:solidFill>
             <a:schemeClr val="tx1"/>
           </a:solidFill>
@@ -3357,14 +2986,14 @@
           <p:nvPr>
             <p:extLst>
               <p:ext uri="{D42A27DB-BD31-4B8C-83A1-F6EECF244321}">
-                <p14:modId xmlns:p14="http://schemas.microsoft.com/office/powerpoint/2010/main" val="2819166196"/>
+                <p14:modId xmlns:p14="http://schemas.microsoft.com/office/powerpoint/2010/main" val="1740345972"/>
               </p:ext>
             </p:extLst>
           </p:nvPr>
         </p:nvGraphicFramePr>
         <p:xfrm>
-          <a:off x="1" y="719665"/>
-          <a:ext cx="12192004" cy="4033312"/>
+          <a:off x="0" y="419869"/>
+          <a:ext cx="12801599" cy="6385692"/>
         </p:xfrm>
         <a:graphic>
           <a:graphicData uri="http://schemas.openxmlformats.org/drawingml/2006/table">
@@ -3373,98 +3002,98 @@
                 <a:tableStyleId>{85BE263C-DBD7-4A20-BB59-AAB30ACAA65A}</a:tableStyleId>
               </a:tblPr>
               <a:tblGrid>
-                <a:gridCol w="1785474">
+                <a:gridCol w="2040835">
                   <a:extLst>
                     <a:ext uri="{9D8B030D-6E8A-4147-A177-3AD203B41FA5}">
                       <a16:colId xmlns:a16="http://schemas.microsoft.com/office/drawing/2014/main" val="330396486"/>
                     </a:ext>
                   </a:extLst>
                 </a:gridCol>
-                <a:gridCol w="834794">
+                <a:gridCol w="710446">
                   <a:extLst>
                     <a:ext uri="{9D8B030D-6E8A-4147-A177-3AD203B41FA5}">
                       <a16:colId xmlns:a16="http://schemas.microsoft.com/office/drawing/2014/main" val="3844435648"/>
                     </a:ext>
                   </a:extLst>
                 </a:gridCol>
-                <a:gridCol w="793459">
+                <a:gridCol w="833131">
                   <a:extLst>
                     <a:ext uri="{9D8B030D-6E8A-4147-A177-3AD203B41FA5}">
                       <a16:colId xmlns:a16="http://schemas.microsoft.com/office/drawing/2014/main" val="399694506"/>
                     </a:ext>
                   </a:extLst>
                 </a:gridCol>
-                <a:gridCol w="733195">
+                <a:gridCol w="868318">
                   <a:extLst>
                     <a:ext uri="{9D8B030D-6E8A-4147-A177-3AD203B41FA5}">
                       <a16:colId xmlns:a16="http://schemas.microsoft.com/office/drawing/2014/main" val="1805544061"/>
                     </a:ext>
                   </a:extLst>
                 </a:gridCol>
-                <a:gridCol w="803502">
+                <a:gridCol w="745213">
                   <a:extLst>
                     <a:ext uri="{9D8B030D-6E8A-4147-A177-3AD203B41FA5}">
                       <a16:colId xmlns:a16="http://schemas.microsoft.com/office/drawing/2014/main" val="1950924311"/>
                     </a:ext>
                   </a:extLst>
                 </a:gridCol>
-                <a:gridCol w="773372">
+                <a:gridCol w="812040">
                   <a:extLst>
                     <a:ext uri="{9D8B030D-6E8A-4147-A177-3AD203B41FA5}">
                       <a16:colId xmlns:a16="http://schemas.microsoft.com/office/drawing/2014/main" val="4178213046"/>
                     </a:ext>
                   </a:extLst>
                 </a:gridCol>
-                <a:gridCol w="773372">
+                <a:gridCol w="812040">
                   <a:extLst>
                     <a:ext uri="{9D8B030D-6E8A-4147-A177-3AD203B41FA5}">
                       <a16:colId xmlns:a16="http://schemas.microsoft.com/office/drawing/2014/main" val="777372749"/>
                     </a:ext>
                   </a:extLst>
                 </a:gridCol>
-                <a:gridCol w="853723">
+                <a:gridCol w="896409">
                   <a:extLst>
                     <a:ext uri="{9D8B030D-6E8A-4147-A177-3AD203B41FA5}">
                       <a16:colId xmlns:a16="http://schemas.microsoft.com/office/drawing/2014/main" val="2803986381"/>
                     </a:ext>
                   </a:extLst>
                 </a:gridCol>
-                <a:gridCol w="843678">
+                <a:gridCol w="885862">
                   <a:extLst>
                     <a:ext uri="{9D8B030D-6E8A-4147-A177-3AD203B41FA5}">
                       <a16:colId xmlns:a16="http://schemas.microsoft.com/office/drawing/2014/main" val="880963435"/>
                     </a:ext>
                   </a:extLst>
                 </a:gridCol>
-                <a:gridCol w="843678">
+                <a:gridCol w="885862">
                   <a:extLst>
                     <a:ext uri="{9D8B030D-6E8A-4147-A177-3AD203B41FA5}">
                       <a16:colId xmlns:a16="http://schemas.microsoft.com/office/drawing/2014/main" val="1435573125"/>
                     </a:ext>
                   </a:extLst>
                 </a:gridCol>
-                <a:gridCol w="783417">
+                <a:gridCol w="822587">
                   <a:extLst>
                     <a:ext uri="{9D8B030D-6E8A-4147-A177-3AD203B41FA5}">
                       <a16:colId xmlns:a16="http://schemas.microsoft.com/office/drawing/2014/main" val="4064370979"/>
                     </a:ext>
                   </a:extLst>
                 </a:gridCol>
-                <a:gridCol w="753283">
+                <a:gridCol w="790947">
                   <a:extLst>
                     <a:ext uri="{9D8B030D-6E8A-4147-A177-3AD203B41FA5}">
                       <a16:colId xmlns:a16="http://schemas.microsoft.com/office/drawing/2014/main" val="3039446690"/>
                     </a:ext>
                   </a:extLst>
                 </a:gridCol>
-                <a:gridCol w="783417">
+                <a:gridCol w="822587">
                   <a:extLst>
                     <a:ext uri="{9D8B030D-6E8A-4147-A177-3AD203B41FA5}">
                       <a16:colId xmlns:a16="http://schemas.microsoft.com/office/drawing/2014/main" val="1297540180"/>
                     </a:ext>
                   </a:extLst>
                 </a:gridCol>
-                <a:gridCol w="833640">
+                <a:gridCol w="875322">
                   <a:extLst>
                     <a:ext uri="{9D8B030D-6E8A-4147-A177-3AD203B41FA5}">
                       <a16:colId xmlns:a16="http://schemas.microsoft.com/office/drawing/2014/main" val="993375519"/>
@@ -3472,7 +3101,7 @@
                   </a:extLst>
                 </a:gridCol>
               </a:tblGrid>
-              <a:tr h="504164">
+              <a:tr h="1317892">
                 <a:tc>
                   <a:txBody>
                     <a:bodyPr/>
@@ -3491,165 +3120,269 @@
                     <a:bodyPr/>
                     <a:lstStyle/>
                     <a:p>
+                      <a:pPr algn="ctr"/>
                       <a:r>
                         <a:rPr lang="en-SG" dirty="0"/>
                         <a:t>13</a:t>
                       </a:r>
                     </a:p>
-                  </a:txBody>
-                  <a:tcPr/>
-                </a:tc>
-                <a:tc>
-                  <a:txBody>
-                    <a:bodyPr/>
-                    <a:lstStyle/>
-                    <a:p>
+                    <a:p>
+                      <a:pPr algn="ctr"/>
+                      <a:r>
+                        <a:rPr lang="en-SG" dirty="0"/>
+                        <a:t>Sat</a:t>
+                      </a:r>
+                    </a:p>
+                  </a:txBody>
+                  <a:tcPr/>
+                </a:tc>
+                <a:tc>
+                  <a:txBody>
+                    <a:bodyPr/>
+                    <a:lstStyle/>
+                    <a:p>
+                      <a:pPr algn="ctr"/>
                       <a:r>
                         <a:rPr lang="en-SG" dirty="0"/>
                         <a:t>14</a:t>
                       </a:r>
                     </a:p>
-                  </a:txBody>
-                  <a:tcPr/>
-                </a:tc>
-                <a:tc>
-                  <a:txBody>
-                    <a:bodyPr/>
-                    <a:lstStyle/>
-                    <a:p>
+                    <a:p>
+                      <a:pPr algn="ctr"/>
+                      <a:r>
+                        <a:rPr lang="en-SG" dirty="0"/>
+                        <a:t>Sun</a:t>
+                      </a:r>
+                    </a:p>
+                  </a:txBody>
+                  <a:tcPr/>
+                </a:tc>
+                <a:tc>
+                  <a:txBody>
+                    <a:bodyPr/>
+                    <a:lstStyle/>
+                    <a:p>
+                      <a:pPr algn="ctr"/>
                       <a:r>
                         <a:rPr lang="en-SG" dirty="0"/>
                         <a:t>15</a:t>
                       </a:r>
                     </a:p>
-                  </a:txBody>
-                  <a:tcPr/>
-                </a:tc>
-                <a:tc>
-                  <a:txBody>
-                    <a:bodyPr/>
-                    <a:lstStyle/>
-                    <a:p>
+                    <a:p>
+                      <a:pPr algn="ctr"/>
+                      <a:r>
+                        <a:rPr lang="en-SG" dirty="0"/>
+                        <a:t>Mon</a:t>
+                      </a:r>
+                    </a:p>
+                  </a:txBody>
+                  <a:tcPr/>
+                </a:tc>
+                <a:tc>
+                  <a:txBody>
+                    <a:bodyPr/>
+                    <a:lstStyle/>
+                    <a:p>
+                      <a:pPr algn="ctr"/>
                       <a:r>
                         <a:rPr lang="en-SG" dirty="0"/>
                         <a:t>16</a:t>
                       </a:r>
                     </a:p>
-                  </a:txBody>
-                  <a:tcPr/>
-                </a:tc>
-                <a:tc>
-                  <a:txBody>
-                    <a:bodyPr/>
-                    <a:lstStyle/>
-                    <a:p>
+                    <a:p>
+                      <a:pPr algn="ctr"/>
+                      <a:r>
+                        <a:rPr lang="en-SG" dirty="0"/>
+                        <a:t>Tue</a:t>
+                      </a:r>
+                    </a:p>
+                  </a:txBody>
+                  <a:tcPr/>
+                </a:tc>
+                <a:tc>
+                  <a:txBody>
+                    <a:bodyPr/>
+                    <a:lstStyle/>
+                    <a:p>
+                      <a:pPr algn="ctr"/>
                       <a:r>
                         <a:rPr lang="en-SG" dirty="0"/>
                         <a:t>17</a:t>
                       </a:r>
                     </a:p>
-                  </a:txBody>
-                  <a:tcPr/>
-                </a:tc>
-                <a:tc>
-                  <a:txBody>
-                    <a:bodyPr/>
-                    <a:lstStyle/>
-                    <a:p>
+                    <a:p>
+                      <a:pPr algn="ctr"/>
+                      <a:r>
+                        <a:rPr lang="en-SG" dirty="0"/>
+                        <a:t>Wed</a:t>
+                      </a:r>
+                    </a:p>
+                  </a:txBody>
+                  <a:tcPr/>
+                </a:tc>
+                <a:tc>
+                  <a:txBody>
+                    <a:bodyPr/>
+                    <a:lstStyle/>
+                    <a:p>
+                      <a:pPr algn="ctr"/>
                       <a:r>
                         <a:rPr lang="en-SG" dirty="0"/>
                         <a:t>18</a:t>
                       </a:r>
                     </a:p>
-                  </a:txBody>
-                  <a:tcPr/>
-                </a:tc>
-                <a:tc>
-                  <a:txBody>
-                    <a:bodyPr/>
-                    <a:lstStyle/>
-                    <a:p>
+                    <a:p>
+                      <a:pPr algn="ctr"/>
+                      <a:r>
+                        <a:rPr lang="en-SG" dirty="0"/>
+                        <a:t>Thu</a:t>
+                      </a:r>
+                    </a:p>
+                  </a:txBody>
+                  <a:tcPr/>
+                </a:tc>
+                <a:tc>
+                  <a:txBody>
+                    <a:bodyPr/>
+                    <a:lstStyle/>
+                    <a:p>
+                      <a:pPr algn="ctr"/>
                       <a:r>
                         <a:rPr lang="en-SG" dirty="0"/>
                         <a:t>19</a:t>
                       </a:r>
                     </a:p>
-                  </a:txBody>
-                  <a:tcPr/>
-                </a:tc>
-                <a:tc>
-                  <a:txBody>
-                    <a:bodyPr/>
-                    <a:lstStyle/>
-                    <a:p>
+                    <a:p>
+                      <a:pPr algn="ctr"/>
+                      <a:r>
+                        <a:rPr lang="en-SG" dirty="0"/>
+                        <a:t>Fri</a:t>
+                      </a:r>
+                    </a:p>
+                  </a:txBody>
+                  <a:tcPr/>
+                </a:tc>
+                <a:tc>
+                  <a:txBody>
+                    <a:bodyPr/>
+                    <a:lstStyle/>
+                    <a:p>
+                      <a:pPr algn="ctr"/>
                       <a:r>
                         <a:rPr lang="en-SG" dirty="0"/>
                         <a:t>20</a:t>
                       </a:r>
                     </a:p>
-                  </a:txBody>
-                  <a:tcPr/>
-                </a:tc>
-                <a:tc>
-                  <a:txBody>
-                    <a:bodyPr/>
-                    <a:lstStyle/>
-                    <a:p>
+                    <a:p>
+                      <a:pPr algn="ctr"/>
+                      <a:r>
+                        <a:rPr lang="en-SG" dirty="0"/>
+                        <a:t>Sat</a:t>
+                      </a:r>
+                    </a:p>
+                  </a:txBody>
+                  <a:tcPr/>
+                </a:tc>
+                <a:tc>
+                  <a:txBody>
+                    <a:bodyPr/>
+                    <a:lstStyle/>
+                    <a:p>
+                      <a:pPr algn="ctr"/>
                       <a:r>
                         <a:rPr lang="en-SG" dirty="0"/>
                         <a:t>21</a:t>
                       </a:r>
                     </a:p>
-                  </a:txBody>
-                  <a:tcPr/>
-                </a:tc>
-                <a:tc>
-                  <a:txBody>
-                    <a:bodyPr/>
-                    <a:lstStyle/>
-                    <a:p>
+                    <a:p>
+                      <a:pPr algn="ctr"/>
+                      <a:r>
+                        <a:rPr lang="en-SG" dirty="0"/>
+                        <a:t>Sun</a:t>
+                      </a:r>
+                    </a:p>
+                  </a:txBody>
+                  <a:tcPr/>
+                </a:tc>
+                <a:tc>
+                  <a:txBody>
+                    <a:bodyPr/>
+                    <a:lstStyle/>
+                    <a:p>
+                      <a:pPr algn="ctr"/>
                       <a:r>
                         <a:rPr lang="en-SG" dirty="0"/>
                         <a:t>22</a:t>
                       </a:r>
                     </a:p>
-                  </a:txBody>
-                  <a:tcPr/>
-                </a:tc>
-                <a:tc>
-                  <a:txBody>
-                    <a:bodyPr/>
-                    <a:lstStyle/>
-                    <a:p>
+                    <a:p>
+                      <a:pPr algn="ctr"/>
+                      <a:r>
+                        <a:rPr lang="en-SG" dirty="0"/>
+                        <a:t>Mon</a:t>
+                      </a:r>
+                    </a:p>
+                  </a:txBody>
+                  <a:tcPr/>
+                </a:tc>
+                <a:tc>
+                  <a:txBody>
+                    <a:bodyPr/>
+                    <a:lstStyle/>
+                    <a:p>
+                      <a:pPr algn="ctr"/>
                       <a:r>
                         <a:rPr lang="en-SG" dirty="0"/>
                         <a:t>23</a:t>
                       </a:r>
                     </a:p>
-                  </a:txBody>
-                  <a:tcPr/>
-                </a:tc>
-                <a:tc>
-                  <a:txBody>
-                    <a:bodyPr/>
-                    <a:lstStyle/>
-                    <a:p>
+                    <a:p>
+                      <a:pPr algn="ctr"/>
+                      <a:r>
+                        <a:rPr lang="en-SG" dirty="0"/>
+                        <a:t>Tue</a:t>
+                      </a:r>
+                    </a:p>
+                  </a:txBody>
+                  <a:tcPr/>
+                </a:tc>
+                <a:tc>
+                  <a:txBody>
+                    <a:bodyPr/>
+                    <a:lstStyle/>
+                    <a:p>
+                      <a:pPr algn="ctr"/>
                       <a:r>
                         <a:rPr lang="en-SG" dirty="0"/>
                         <a:t>24</a:t>
                       </a:r>
                     </a:p>
-                  </a:txBody>
-                  <a:tcPr/>
-                </a:tc>
-                <a:tc>
-                  <a:txBody>
-                    <a:bodyPr/>
-                    <a:lstStyle/>
-                    <a:p>
+                    <a:p>
+                      <a:pPr algn="ctr"/>
+                      <a:r>
+                        <a:rPr lang="en-SG" dirty="0"/>
+                        <a:t>Wed</a:t>
+                      </a:r>
+                    </a:p>
+                  </a:txBody>
+                  <a:tcPr/>
+                </a:tc>
+                <a:tc>
+                  <a:txBody>
+                    <a:bodyPr/>
+                    <a:lstStyle/>
+                    <a:p>
+                      <a:pPr algn="ctr"/>
                       <a:r>
                         <a:rPr lang="en-SG" dirty="0"/>
                         <a:t>25</a:t>
+                      </a:r>
+                    </a:p>
+                    <a:p>
+                      <a:pPr algn="ctr"/>
+                      <a:r>
+                        <a:rPr lang="en-SG" dirty="0"/>
+                        <a:t>Thu</a:t>
                       </a:r>
                     </a:p>
                   </a:txBody>
@@ -3661,7 +3394,7 @@
                   </a:ext>
                 </a:extLst>
               </a:tr>
-              <a:tr h="504164">
+              <a:tr h="534290">
                 <a:tc>
                   <a:txBody>
                     <a:bodyPr/>
@@ -3744,30 +3477,48 @@
                     <a:bodyPr/>
                     <a:lstStyle/>
                     <a:p>
-                      <a:endParaRPr lang="en-SG"/>
-                    </a:p>
-                  </a:txBody>
-                  <a:tcPr/>
-                </a:tc>
-                <a:tc>
-                  <a:txBody>
-                    <a:bodyPr/>
-                    <a:lstStyle/>
-                    <a:p>
-                      <a:endParaRPr lang="en-SG"/>
-                    </a:p>
-                  </a:txBody>
-                  <a:tcPr/>
-                </a:tc>
-                <a:tc>
-                  <a:txBody>
-                    <a:bodyPr/>
-                    <a:lstStyle/>
-                    <a:p>
-                      <a:endParaRPr lang="en-SG"/>
-                    </a:p>
-                  </a:txBody>
-                  <a:tcPr/>
+                      <a:endParaRPr lang="en-SG" dirty="0"/>
+                    </a:p>
+                  </a:txBody>
+                  <a:tcPr>
+                    <a:solidFill>
+                      <a:schemeClr val="accent1">
+                        <a:lumMod val="75000"/>
+                      </a:schemeClr>
+                    </a:solidFill>
+                  </a:tcPr>
+                </a:tc>
+                <a:tc>
+                  <a:txBody>
+                    <a:bodyPr/>
+                    <a:lstStyle/>
+                    <a:p>
+                      <a:endParaRPr lang="en-SG" dirty="0"/>
+                    </a:p>
+                  </a:txBody>
+                  <a:tcPr>
+                    <a:solidFill>
+                      <a:schemeClr val="accent1">
+                        <a:lumMod val="75000"/>
+                      </a:schemeClr>
+                    </a:solidFill>
+                  </a:tcPr>
+                </a:tc>
+                <a:tc>
+                  <a:txBody>
+                    <a:bodyPr/>
+                    <a:lstStyle/>
+                    <a:p>
+                      <a:endParaRPr lang="en-SG" dirty="0"/>
+                    </a:p>
+                  </a:txBody>
+                  <a:tcPr>
+                    <a:solidFill>
+                      <a:schemeClr val="accent1">
+                        <a:lumMod val="75000"/>
+                      </a:schemeClr>
+                    </a:solidFill>
+                  </a:tcPr>
                 </a:tc>
                 <a:tc>
                   <a:txBody>
@@ -3835,93 +3586,136 @@
                   </a:ext>
                 </a:extLst>
               </a:tr>
-              <a:tr h="504164">
-                <a:tc>
-                  <a:txBody>
-                    <a:bodyPr/>
-                    <a:lstStyle/>
-                    <a:p>
-                      <a:endParaRPr lang="en-SG" dirty="0"/>
-                    </a:p>
-                  </a:txBody>
-                  <a:tcPr/>
-                </a:tc>
-                <a:tc>
-                  <a:txBody>
-                    <a:bodyPr/>
-                    <a:lstStyle/>
-                    <a:p>
-                      <a:endParaRPr lang="en-SG"/>
-                    </a:p>
-                  </a:txBody>
-                  <a:tcPr/>
-                </a:tc>
-                <a:tc>
-                  <a:txBody>
-                    <a:bodyPr/>
-                    <a:lstStyle/>
-                    <a:p>
-                      <a:endParaRPr lang="en-SG"/>
-                    </a:p>
-                  </a:txBody>
-                  <a:tcPr/>
-                </a:tc>
-                <a:tc>
-                  <a:txBody>
-                    <a:bodyPr/>
-                    <a:lstStyle/>
-                    <a:p>
-                      <a:endParaRPr lang="en-SG"/>
-                    </a:p>
-                  </a:txBody>
-                  <a:tcPr/>
-                </a:tc>
-                <a:tc>
-                  <a:txBody>
-                    <a:bodyPr/>
-                    <a:lstStyle/>
-                    <a:p>
-                      <a:endParaRPr lang="en-SG"/>
-                    </a:p>
-                  </a:txBody>
-                  <a:tcPr/>
-                </a:tc>
-                <a:tc>
-                  <a:txBody>
-                    <a:bodyPr/>
-                    <a:lstStyle/>
-                    <a:p>
-                      <a:endParaRPr lang="en-SG"/>
-                    </a:p>
-                  </a:txBody>
-                  <a:tcPr/>
-                </a:tc>
-                <a:tc>
-                  <a:txBody>
-                    <a:bodyPr/>
-                    <a:lstStyle/>
-                    <a:p>
-                      <a:endParaRPr lang="en-SG"/>
-                    </a:p>
-                  </a:txBody>
-                  <a:tcPr/>
-                </a:tc>
-                <a:tc>
-                  <a:txBody>
-                    <a:bodyPr/>
-                    <a:lstStyle/>
-                    <a:p>
-                      <a:endParaRPr lang="en-SG"/>
-                    </a:p>
-                  </a:txBody>
-                  <a:tcPr/>
-                </a:tc>
-                <a:tc>
-                  <a:txBody>
-                    <a:bodyPr/>
-                    <a:lstStyle/>
-                    <a:p>
-                      <a:endParaRPr lang="en-SG"/>
+              <a:tr h="534290">
+                <a:tc rowSpan="2">
+                  <a:txBody>
+                    <a:bodyPr/>
+                    <a:lstStyle/>
+                    <a:p>
+                      <a:r>
+                        <a:rPr lang="en-SG" dirty="0"/>
+                        <a:t>Calendar</a:t>
+                      </a:r>
+                    </a:p>
+                    <a:p>
+                      <a:r>
+                        <a:rPr lang="en-SG" dirty="0"/>
+                        <a:t>(Improvements)</a:t>
+                      </a:r>
+                    </a:p>
+                  </a:txBody>
+                  <a:tcPr>
+                    <a:lnB w="12700" cap="flat" cmpd="sng" algn="ctr">
+                      <a:solidFill>
+                        <a:schemeClr val="tx1"/>
+                      </a:solidFill>
+                      <a:prstDash val="solid"/>
+                      <a:round/>
+                      <a:headEnd type="none" w="med" len="med"/>
+                      <a:tailEnd type="none" w="med" len="med"/>
+                    </a:lnB>
+                  </a:tcPr>
+                </a:tc>
+                <a:tc>
+                  <a:txBody>
+                    <a:bodyPr/>
+                    <a:lstStyle/>
+                    <a:p>
+                      <a:endParaRPr lang="en-SG" dirty="0"/>
+                    </a:p>
+                  </a:txBody>
+                  <a:tcPr>
+                    <a:solidFill>
+                      <a:srgbClr val="92D050"/>
+                    </a:solidFill>
+                  </a:tcPr>
+                </a:tc>
+                <a:tc>
+                  <a:txBody>
+                    <a:bodyPr/>
+                    <a:lstStyle/>
+                    <a:p>
+                      <a:endParaRPr lang="en-SG" dirty="0"/>
+                    </a:p>
+                  </a:txBody>
+                  <a:tcPr>
+                    <a:solidFill>
+                      <a:srgbClr val="92D050"/>
+                    </a:solidFill>
+                  </a:tcPr>
+                </a:tc>
+                <a:tc>
+                  <a:txBody>
+                    <a:bodyPr/>
+                    <a:lstStyle/>
+                    <a:p>
+                      <a:endParaRPr lang="en-SG" dirty="0"/>
+                    </a:p>
+                  </a:txBody>
+                  <a:tcPr>
+                    <a:solidFill>
+                      <a:srgbClr val="92D050"/>
+                    </a:solidFill>
+                  </a:tcPr>
+                </a:tc>
+                <a:tc>
+                  <a:txBody>
+                    <a:bodyPr/>
+                    <a:lstStyle/>
+                    <a:p>
+                      <a:endParaRPr lang="en-SG" dirty="0"/>
+                    </a:p>
+                  </a:txBody>
+                  <a:tcPr>
+                    <a:solidFill>
+                      <a:srgbClr val="92D050"/>
+                    </a:solidFill>
+                  </a:tcPr>
+                </a:tc>
+                <a:tc>
+                  <a:txBody>
+                    <a:bodyPr/>
+                    <a:lstStyle/>
+                    <a:p>
+                      <a:endParaRPr lang="en-SG" dirty="0"/>
+                    </a:p>
+                  </a:txBody>
+                  <a:tcPr>
+                    <a:solidFill>
+                      <a:srgbClr val="92D050"/>
+                    </a:solidFill>
+                  </a:tcPr>
+                </a:tc>
+                <a:tc>
+                  <a:txBody>
+                    <a:bodyPr/>
+                    <a:lstStyle/>
+                    <a:p>
+                      <a:endParaRPr lang="en-SG" dirty="0"/>
+                    </a:p>
+                  </a:txBody>
+                  <a:tcPr>
+                    <a:solidFill>
+                      <a:srgbClr val="92D050"/>
+                    </a:solidFill>
+                  </a:tcPr>
+                </a:tc>
+                <a:tc>
+                  <a:txBody>
+                    <a:bodyPr/>
+                    <a:lstStyle/>
+                    <a:p>
+                      <a:endParaRPr lang="en-SG" dirty="0"/>
+                    </a:p>
+                  </a:txBody>
+                  <a:tcPr/>
+                </a:tc>
+                <a:tc>
+                  <a:txBody>
+                    <a:bodyPr/>
+                    <a:lstStyle/>
+                    <a:p>
+                      <a:endParaRPr lang="en-SG" dirty="0"/>
                     </a:p>
                   </a:txBody>
                   <a:tcPr/>
@@ -3982,7 +3776,101 @@
                   </a:ext>
                 </a:extLst>
               </a:tr>
-              <a:tr h="504164">
+              <a:tr h="783602">
+                <a:tc vMerge="1">
+                  <a:txBody>
+                    <a:bodyPr/>
+                    <a:lstStyle/>
+                    <a:p>
+                      <a:endParaRPr lang="en-SG" dirty="0"/>
+                    </a:p>
+                  </a:txBody>
+                  <a:tcPr/>
+                </a:tc>
+                <a:tc>
+                  <a:txBody>
+                    <a:bodyPr/>
+                    <a:lstStyle/>
+                    <a:p>
+                      <a:endParaRPr lang="en-SG" dirty="0"/>
+                    </a:p>
+                  </a:txBody>
+                  <a:tcPr>
+                    <a:solidFill>
+                      <a:srgbClr val="FFC000"/>
+                    </a:solidFill>
+                  </a:tcPr>
+                </a:tc>
+                <a:tc>
+                  <a:txBody>
+                    <a:bodyPr/>
+                    <a:lstStyle/>
+                    <a:p>
+                      <a:endParaRPr lang="en-SG" dirty="0"/>
+                    </a:p>
+                  </a:txBody>
+                  <a:tcPr>
+                    <a:solidFill>
+                      <a:srgbClr val="FFC000"/>
+                    </a:solidFill>
+                  </a:tcPr>
+                </a:tc>
+                <a:tc>
+                  <a:txBody>
+                    <a:bodyPr/>
+                    <a:lstStyle/>
+                    <a:p>
+                      <a:endParaRPr lang="en-SG" dirty="0"/>
+                    </a:p>
+                  </a:txBody>
+                  <a:tcPr>
+                    <a:solidFill>
+                      <a:srgbClr val="FFC000"/>
+                    </a:solidFill>
+                  </a:tcPr>
+                </a:tc>
+                <a:tc>
+                  <a:txBody>
+                    <a:bodyPr/>
+                    <a:lstStyle/>
+                    <a:p>
+                      <a:endParaRPr lang="en-SG" dirty="0"/>
+                    </a:p>
+                  </a:txBody>
+                  <a:tcPr>
+                    <a:solidFill>
+                      <a:srgbClr val="FFC000"/>
+                    </a:solidFill>
+                  </a:tcPr>
+                </a:tc>
+                <a:tc>
+                  <a:txBody>
+                    <a:bodyPr/>
+                    <a:lstStyle/>
+                    <a:p>
+                      <a:endParaRPr lang="en-SG" dirty="0"/>
+                    </a:p>
+                  </a:txBody>
+                  <a:tcPr>
+                    <a:solidFill>
+                      <a:srgbClr val="FFC000"/>
+                    </a:solidFill>
+                  </a:tcPr>
+                </a:tc>
+                <a:tc>
+                  <a:txBody>
+                    <a:bodyPr/>
+                    <a:lstStyle/>
+                    <a:p>
+                      <a:endParaRPr lang="en-SG" dirty="0"/>
+                    </a:p>
+                  </a:txBody>
+                  <a:tcPr>
+                    <a:solidFill>
+                      <a:srgbClr val="FFC000"/>
+                    </a:solidFill>
+                  </a:tcPr>
+                </a:tc>
                 <a:tc>
                   <a:txBody>
                     <a:bodyPr/>
@@ -4048,77 +3936,7 @@
                     <a:bodyPr/>
                     <a:lstStyle/>
                     <a:p>
-                      <a:endParaRPr lang="en-SG"/>
-                    </a:p>
-                  </a:txBody>
-                  <a:tcPr/>
-                </a:tc>
-                <a:tc>
-                  <a:txBody>
-                    <a:bodyPr/>
-                    <a:lstStyle/>
-                    <a:p>
-                      <a:endParaRPr lang="en-SG"/>
-                    </a:p>
-                  </a:txBody>
-                  <a:tcPr/>
-                </a:tc>
-                <a:tc>
-                  <a:txBody>
-                    <a:bodyPr/>
-                    <a:lstStyle/>
-                    <a:p>
-                      <a:endParaRPr lang="en-SG"/>
-                    </a:p>
-                  </a:txBody>
-                  <a:tcPr/>
-                </a:tc>
-                <a:tc>
-                  <a:txBody>
-                    <a:bodyPr/>
-                    <a:lstStyle/>
-                    <a:p>
-                      <a:endParaRPr lang="en-SG"/>
-                    </a:p>
-                  </a:txBody>
-                  <a:tcPr/>
-                </a:tc>
-                <a:tc>
-                  <a:txBody>
-                    <a:bodyPr/>
-                    <a:lstStyle/>
-                    <a:p>
-                      <a:endParaRPr lang="en-SG"/>
-                    </a:p>
-                  </a:txBody>
-                  <a:tcPr/>
-                </a:tc>
-                <a:tc>
-                  <a:txBody>
-                    <a:bodyPr/>
-                    <a:lstStyle/>
-                    <a:p>
-                      <a:endParaRPr lang="en-SG"/>
-                    </a:p>
-                  </a:txBody>
-                  <a:tcPr/>
-                </a:tc>
-                <a:tc>
-                  <a:txBody>
-                    <a:bodyPr/>
-                    <a:lstStyle/>
-                    <a:p>
-                      <a:endParaRPr lang="en-SG"/>
-                    </a:p>
-                  </a:txBody>
-                  <a:tcPr/>
-                </a:tc>
-                <a:tc>
-                  <a:txBody>
-                    <a:bodyPr/>
-                    <a:lstStyle/>
-                    <a:p>
-                      <a:endParaRPr lang="en-SG"/>
+                      <a:endParaRPr lang="en-SG" dirty="0"/>
                     </a:p>
                   </a:txBody>
                   <a:tcPr/>
@@ -4129,103 +3947,148 @@
                   </a:ext>
                 </a:extLst>
               </a:tr>
-              <a:tr h="504164">
-                <a:tc>
-                  <a:txBody>
-                    <a:bodyPr/>
-                    <a:lstStyle/>
-                    <a:p>
-                      <a:endParaRPr lang="en-SG" dirty="0"/>
-                    </a:p>
-                  </a:txBody>
-                  <a:tcPr/>
-                </a:tc>
-                <a:tc>
-                  <a:txBody>
-                    <a:bodyPr/>
-                    <a:lstStyle/>
-                    <a:p>
-                      <a:endParaRPr lang="en-SG"/>
-                    </a:p>
-                  </a:txBody>
-                  <a:tcPr/>
-                </a:tc>
-                <a:tc>
-                  <a:txBody>
-                    <a:bodyPr/>
-                    <a:lstStyle/>
-                    <a:p>
-                      <a:endParaRPr lang="en-SG"/>
-                    </a:p>
-                  </a:txBody>
-                  <a:tcPr/>
-                </a:tc>
-                <a:tc>
-                  <a:txBody>
-                    <a:bodyPr/>
-                    <a:lstStyle/>
-                    <a:p>
-                      <a:endParaRPr lang="en-SG"/>
-                    </a:p>
-                  </a:txBody>
-                  <a:tcPr/>
-                </a:tc>
-                <a:tc>
-                  <a:txBody>
-                    <a:bodyPr/>
-                    <a:lstStyle/>
-                    <a:p>
-                      <a:endParaRPr lang="en-SG"/>
-                    </a:p>
-                  </a:txBody>
-                  <a:tcPr/>
-                </a:tc>
-                <a:tc>
-                  <a:txBody>
-                    <a:bodyPr/>
-                    <a:lstStyle/>
-                    <a:p>
-                      <a:endParaRPr lang="en-SG"/>
-                    </a:p>
-                  </a:txBody>
-                  <a:tcPr/>
-                </a:tc>
-                <a:tc>
-                  <a:txBody>
-                    <a:bodyPr/>
-                    <a:lstStyle/>
-                    <a:p>
-                      <a:endParaRPr lang="en-SG"/>
-                    </a:p>
-                  </a:txBody>
-                  <a:tcPr/>
-                </a:tc>
-                <a:tc>
-                  <a:txBody>
-                    <a:bodyPr/>
-                    <a:lstStyle/>
-                    <a:p>
-                      <a:endParaRPr lang="en-SG"/>
-                    </a:p>
-                  </a:txBody>
-                  <a:tcPr/>
-                </a:tc>
-                <a:tc>
-                  <a:txBody>
-                    <a:bodyPr/>
-                    <a:lstStyle/>
-                    <a:p>
-                      <a:endParaRPr lang="en-SG"/>
-                    </a:p>
-                  </a:txBody>
-                  <a:tcPr/>
-                </a:tc>
-                <a:tc>
-                  <a:txBody>
-                    <a:bodyPr/>
-                    <a:lstStyle/>
-                    <a:p>
-                      <a:endParaRPr lang="en-SG"/>
+              <a:tr h="910896">
+                <a:tc>
+                  <a:txBody>
+                    <a:bodyPr/>
+                    <a:lstStyle/>
+                    <a:p>
+                      <a:r>
+                        <a:rPr lang="en-SG" dirty="0"/>
+                        <a:t>More Tests</a:t>
+                      </a:r>
+                    </a:p>
+                    <a:p>
+                      <a:r>
+                        <a:rPr lang="en-SG" dirty="0"/>
+                        <a:t>(Validation)</a:t>
+                      </a:r>
+                    </a:p>
+                  </a:txBody>
+                  <a:tcPr>
+                    <a:lnT w="12700" cap="flat" cmpd="sng" algn="ctr">
+                      <a:solidFill>
+                        <a:schemeClr val="tx1"/>
+                      </a:solidFill>
+                      <a:prstDash val="solid"/>
+                      <a:round/>
+                      <a:headEnd type="none" w="med" len="med"/>
+                      <a:tailEnd type="none" w="med" len="med"/>
+                    </a:lnT>
+                  </a:tcPr>
+                </a:tc>
+                <a:tc>
+                  <a:txBody>
+                    <a:bodyPr/>
+                    <a:lstStyle/>
+                    <a:p>
+                      <a:endParaRPr lang="en-SG" dirty="0"/>
+                    </a:p>
+                  </a:txBody>
+                  <a:tcPr>
+                    <a:solidFill>
+                      <a:srgbClr val="BDD7EE"/>
+                    </a:solidFill>
+                  </a:tcPr>
+                </a:tc>
+                <a:tc>
+                  <a:txBody>
+                    <a:bodyPr/>
+                    <a:lstStyle/>
+                    <a:p>
+                      <a:endParaRPr lang="en-SG" dirty="0"/>
+                    </a:p>
+                  </a:txBody>
+                  <a:tcPr>
+                    <a:solidFill>
+                      <a:srgbClr val="BDD7EE"/>
+                    </a:solidFill>
+                  </a:tcPr>
+                </a:tc>
+                <a:tc>
+                  <a:txBody>
+                    <a:bodyPr/>
+                    <a:lstStyle/>
+                    <a:p>
+                      <a:endParaRPr lang="en-SG" dirty="0"/>
+                    </a:p>
+                  </a:txBody>
+                  <a:tcPr>
+                    <a:solidFill>
+                      <a:srgbClr val="BDD7EE"/>
+                    </a:solidFill>
+                  </a:tcPr>
+                </a:tc>
+                <a:tc>
+                  <a:txBody>
+                    <a:bodyPr/>
+                    <a:lstStyle/>
+                    <a:p>
+                      <a:endParaRPr lang="en-SG" dirty="0"/>
+                    </a:p>
+                  </a:txBody>
+                  <a:tcPr>
+                    <a:solidFill>
+                      <a:srgbClr val="BDD7EE"/>
+                    </a:solidFill>
+                  </a:tcPr>
+                </a:tc>
+                <a:tc>
+                  <a:txBody>
+                    <a:bodyPr/>
+                    <a:lstStyle/>
+                    <a:p>
+                      <a:endParaRPr lang="en-SG" dirty="0"/>
+                    </a:p>
+                  </a:txBody>
+                  <a:tcPr>
+                    <a:solidFill>
+                      <a:srgbClr val="BDD7EE"/>
+                    </a:solidFill>
+                  </a:tcPr>
+                </a:tc>
+                <a:tc>
+                  <a:txBody>
+                    <a:bodyPr/>
+                    <a:lstStyle/>
+                    <a:p>
+                      <a:endParaRPr lang="en-SG" dirty="0"/>
+                    </a:p>
+                  </a:txBody>
+                  <a:tcPr>
+                    <a:solidFill>
+                      <a:srgbClr val="BDD7EE"/>
+                    </a:solidFill>
+                  </a:tcPr>
+                </a:tc>
+                <a:tc>
+                  <a:txBody>
+                    <a:bodyPr/>
+                    <a:lstStyle/>
+                    <a:p>
+                      <a:endParaRPr lang="en-SG" dirty="0"/>
+                    </a:p>
+                  </a:txBody>
+                  <a:tcPr>
+                    <a:noFill/>
+                  </a:tcPr>
+                </a:tc>
+                <a:tc>
+                  <a:txBody>
+                    <a:bodyPr/>
+                    <a:lstStyle/>
+                    <a:p>
+                      <a:endParaRPr lang="en-SG" dirty="0"/>
+                    </a:p>
+                  </a:txBody>
+                  <a:tcPr/>
+                </a:tc>
+                <a:tc>
+                  <a:txBody>
+                    <a:bodyPr/>
+                    <a:lstStyle/>
+                    <a:p>
+                      <a:endParaRPr lang="en-SG" dirty="0"/>
                     </a:p>
                   </a:txBody>
                   <a:tcPr/>
@@ -4276,13 +4139,16 @@
                   </a:ext>
                 </a:extLst>
               </a:tr>
-              <a:tr h="504164">
-                <a:tc>
-                  <a:txBody>
-                    <a:bodyPr/>
-                    <a:lstStyle/>
-                    <a:p>
-                      <a:endParaRPr lang="en-SG" dirty="0"/>
+              <a:tr h="534290">
+                <a:tc>
+                  <a:txBody>
+                    <a:bodyPr/>
+                    <a:lstStyle/>
+                    <a:p>
+                      <a:r>
+                        <a:rPr lang="en-SG" dirty="0"/>
+                        <a:t>Export </a:t>
+                      </a:r>
                     </a:p>
                   </a:txBody>
                   <a:tcPr/>
@@ -4332,6 +4198,68 @@
                     <a:bodyPr/>
                     <a:lstStyle/>
                     <a:p>
+                      <a:endParaRPr lang="en-SG" dirty="0"/>
+                    </a:p>
+                  </a:txBody>
+                  <a:tcPr>
+                    <a:solidFill>
+                      <a:srgbClr val="BDD7EE"/>
+                    </a:solidFill>
+                  </a:tcPr>
+                </a:tc>
+                <a:tc>
+                  <a:txBody>
+                    <a:bodyPr/>
+                    <a:lstStyle/>
+                    <a:p>
+                      <a:endParaRPr lang="en-SG" dirty="0"/>
+                    </a:p>
+                  </a:txBody>
+                  <a:tcPr>
+                    <a:solidFill>
+                      <a:srgbClr val="BDD7EE"/>
+                    </a:solidFill>
+                  </a:tcPr>
+                </a:tc>
+                <a:tc>
+                  <a:txBody>
+                    <a:bodyPr/>
+                    <a:lstStyle/>
+                    <a:p>
+                      <a:endParaRPr lang="en-SG" dirty="0"/>
+                    </a:p>
+                  </a:txBody>
+                  <a:tcPr>
+                    <a:solidFill>
+                      <a:srgbClr val="BDD7EE"/>
+                    </a:solidFill>
+                  </a:tcPr>
+                </a:tc>
+                <a:tc>
+                  <a:txBody>
+                    <a:bodyPr/>
+                    <a:lstStyle/>
+                    <a:p>
+                      <a:endParaRPr lang="en-SG" dirty="0"/>
+                    </a:p>
+                  </a:txBody>
+                  <a:tcPr/>
+                </a:tc>
+                <a:tc>
+                  <a:txBody>
+                    <a:bodyPr/>
+                    <a:lstStyle/>
+                    <a:p>
+                      <a:endParaRPr lang="en-SG" dirty="0"/>
+                    </a:p>
+                  </a:txBody>
+                  <a:tcPr/>
+                </a:tc>
+                <a:tc>
+                  <a:txBody>
+                    <a:bodyPr/>
+                    <a:lstStyle/>
+                    <a:p>
                       <a:endParaRPr lang="en-SG"/>
                     </a:p>
                   </a:txBody>
@@ -4342,67 +4270,17 @@
                     <a:bodyPr/>
                     <a:lstStyle/>
                     <a:p>
-                      <a:endParaRPr lang="en-SG"/>
-                    </a:p>
-                  </a:txBody>
-                  <a:tcPr/>
-                </a:tc>
-                <a:tc>
-                  <a:txBody>
-                    <a:bodyPr/>
-                    <a:lstStyle/>
-                    <a:p>
-                      <a:endParaRPr lang="en-SG"/>
-                    </a:p>
-                  </a:txBody>
-                  <a:tcPr/>
-                </a:tc>
-                <a:tc>
-                  <a:txBody>
-                    <a:bodyPr/>
-                    <a:lstStyle/>
-                    <a:p>
-                      <a:endParaRPr lang="en-SG"/>
-                    </a:p>
-                  </a:txBody>
-                  <a:tcPr/>
-                </a:tc>
-                <a:tc>
-                  <a:txBody>
-                    <a:bodyPr/>
-                    <a:lstStyle/>
-                    <a:p>
-                      <a:endParaRPr lang="en-SG"/>
-                    </a:p>
-                  </a:txBody>
-                  <a:tcPr/>
-                </a:tc>
-                <a:tc>
-                  <a:txBody>
-                    <a:bodyPr/>
-                    <a:lstStyle/>
-                    <a:p>
-                      <a:endParaRPr lang="en-SG"/>
-                    </a:p>
-                  </a:txBody>
-                  <a:tcPr/>
-                </a:tc>
-                <a:tc>
-                  <a:txBody>
-                    <a:bodyPr/>
-                    <a:lstStyle/>
-                    <a:p>
-                      <a:endParaRPr lang="en-SG"/>
-                    </a:p>
-                  </a:txBody>
-                  <a:tcPr/>
-                </a:tc>
-                <a:tc>
-                  <a:txBody>
-                    <a:bodyPr/>
-                    <a:lstStyle/>
-                    <a:p>
-                      <a:endParaRPr lang="en-SG"/>
+                      <a:endParaRPr lang="en-SG" dirty="0"/>
+                    </a:p>
+                  </a:txBody>
+                  <a:tcPr/>
+                </a:tc>
+                <a:tc>
+                  <a:txBody>
+                    <a:bodyPr/>
+                    <a:lstStyle/>
+                    <a:p>
+                      <a:endParaRPr lang="en-SG" dirty="0"/>
                     </a:p>
                   </a:txBody>
                   <a:tcPr/>
@@ -4423,13 +4301,16 @@
                   </a:ext>
                 </a:extLst>
               </a:tr>
-              <a:tr h="504164">
-                <a:tc>
-                  <a:txBody>
-                    <a:bodyPr/>
-                    <a:lstStyle/>
-                    <a:p>
-                      <a:endParaRPr lang="en-SG" dirty="0"/>
+              <a:tr h="910896">
+                <a:tc>
+                  <a:txBody>
+                    <a:bodyPr/>
+                    <a:lstStyle/>
+                    <a:p>
+                      <a:r>
+                        <a:rPr lang="en-SG" dirty="0"/>
+                        <a:t>Front-end testing</a:t>
+                      </a:r>
                     </a:p>
                   </a:txBody>
                   <a:tcPr/>
@@ -4479,87 +4360,103 @@
                     <a:bodyPr/>
                     <a:lstStyle/>
                     <a:p>
-                      <a:endParaRPr lang="en-SG"/>
-                    </a:p>
-                  </a:txBody>
-                  <a:tcPr/>
-                </a:tc>
-                <a:tc>
-                  <a:txBody>
-                    <a:bodyPr/>
-                    <a:lstStyle/>
-                    <a:p>
-                      <a:endParaRPr lang="en-SG"/>
-                    </a:p>
-                  </a:txBody>
-                  <a:tcPr/>
-                </a:tc>
-                <a:tc>
-                  <a:txBody>
-                    <a:bodyPr/>
-                    <a:lstStyle/>
-                    <a:p>
-                      <a:endParaRPr lang="en-SG"/>
-                    </a:p>
-                  </a:txBody>
-                  <a:tcPr/>
-                </a:tc>
-                <a:tc>
-                  <a:txBody>
-                    <a:bodyPr/>
-                    <a:lstStyle/>
-                    <a:p>
-                      <a:endParaRPr lang="en-SG"/>
-                    </a:p>
-                  </a:txBody>
-                  <a:tcPr/>
-                </a:tc>
-                <a:tc>
-                  <a:txBody>
-                    <a:bodyPr/>
-                    <a:lstStyle/>
-                    <a:p>
-                      <a:endParaRPr lang="en-SG"/>
-                    </a:p>
-                  </a:txBody>
-                  <a:tcPr/>
-                </a:tc>
-                <a:tc>
-                  <a:txBody>
-                    <a:bodyPr/>
-                    <a:lstStyle/>
-                    <a:p>
-                      <a:endParaRPr lang="en-SG"/>
-                    </a:p>
-                  </a:txBody>
-                  <a:tcPr/>
-                </a:tc>
-                <a:tc>
-                  <a:txBody>
-                    <a:bodyPr/>
-                    <a:lstStyle/>
-                    <a:p>
-                      <a:endParaRPr lang="en-SG"/>
-                    </a:p>
-                  </a:txBody>
-                  <a:tcPr/>
-                </a:tc>
-                <a:tc>
-                  <a:txBody>
-                    <a:bodyPr/>
-                    <a:lstStyle/>
-                    <a:p>
-                      <a:endParaRPr lang="en-SG"/>
-                    </a:p>
-                  </a:txBody>
-                  <a:tcPr/>
-                </a:tc>
-                <a:tc>
-                  <a:txBody>
-                    <a:bodyPr/>
-                    <a:lstStyle/>
-                    <a:p>
-                      <a:endParaRPr lang="en-SG"/>
+                      <a:endParaRPr lang="en-SG" dirty="0"/>
+                    </a:p>
+                  </a:txBody>
+                  <a:tcPr/>
+                </a:tc>
+                <a:tc>
+                  <a:txBody>
+                    <a:bodyPr/>
+                    <a:lstStyle/>
+                    <a:p>
+                      <a:endParaRPr lang="en-SG" dirty="0"/>
+                    </a:p>
+                  </a:txBody>
+                  <a:tcPr/>
+                </a:tc>
+                <a:tc>
+                  <a:txBody>
+                    <a:bodyPr/>
+                    <a:lstStyle/>
+                    <a:p>
+                      <a:endParaRPr lang="en-SG" dirty="0"/>
+                    </a:p>
+                  </a:txBody>
+                  <a:tcPr>
+                    <a:solidFill>
+                      <a:srgbClr val="FFC000"/>
+                    </a:solidFill>
+                  </a:tcPr>
+                </a:tc>
+                <a:tc>
+                  <a:txBody>
+                    <a:bodyPr/>
+                    <a:lstStyle/>
+                    <a:p>
+                      <a:endParaRPr lang="en-SG" dirty="0"/>
+                    </a:p>
+                  </a:txBody>
+                  <a:tcPr>
+                    <a:solidFill>
+                      <a:srgbClr val="FFC000"/>
+                    </a:solidFill>
+                  </a:tcPr>
+                </a:tc>
+                <a:tc>
+                  <a:txBody>
+                    <a:bodyPr/>
+                    <a:lstStyle/>
+                    <a:p>
+                      <a:endParaRPr lang="en-SG" dirty="0"/>
+                    </a:p>
+                  </a:txBody>
+                  <a:tcPr>
+                    <a:solidFill>
+                      <a:srgbClr val="FFC000"/>
+                    </a:solidFill>
+                  </a:tcPr>
+                </a:tc>
+                <a:tc>
+                  <a:txBody>
+                    <a:bodyPr/>
+                    <a:lstStyle/>
+                    <a:p>
+                      <a:endParaRPr lang="en-SG" dirty="0"/>
+                    </a:p>
+                  </a:txBody>
+                  <a:tcPr>
+                    <a:solidFill>
+                      <a:srgbClr val="FFC000"/>
+                    </a:solidFill>
+                  </a:tcPr>
+                </a:tc>
+                <a:tc>
+                  <a:txBody>
+                    <a:bodyPr/>
+                    <a:lstStyle/>
+                    <a:p>
+                      <a:endParaRPr lang="en-SG" dirty="0"/>
+                    </a:p>
+                  </a:txBody>
+                  <a:tcPr/>
+                </a:tc>
+                <a:tc>
+                  <a:txBody>
+                    <a:bodyPr/>
+                    <a:lstStyle/>
+                    <a:p>
+                      <a:endParaRPr lang="en-SG" dirty="0"/>
+                    </a:p>
+                  </a:txBody>
+                  <a:tcPr/>
+                </a:tc>
+                <a:tc>
+                  <a:txBody>
+                    <a:bodyPr/>
+                    <a:lstStyle/>
+                    <a:p>
+                      <a:endParaRPr lang="en-SG" dirty="0"/>
                     </a:p>
                   </a:txBody>
                   <a:tcPr/>
@@ -4570,13 +4467,16 @@
                   </a:ext>
                 </a:extLst>
               </a:tr>
-              <a:tr h="504164">
-                <a:tc>
-                  <a:txBody>
-                    <a:bodyPr/>
-                    <a:lstStyle/>
-                    <a:p>
-                      <a:endParaRPr lang="en-SG" dirty="0"/>
+              <a:tr h="534290">
+                <a:tc>
+                  <a:txBody>
+                    <a:bodyPr/>
+                    <a:lstStyle/>
+                    <a:p>
+                      <a:r>
+                        <a:rPr lang="en-SG" dirty="0"/>
+                        <a:t>More test (Sys &amp; Robust)</a:t>
+                      </a:r>
                     </a:p>
                   </a:txBody>
                   <a:tcPr/>
@@ -4626,6 +4526,16 @@
                     <a:bodyPr/>
                     <a:lstStyle/>
                     <a:p>
+                      <a:endParaRPr lang="en-SG" dirty="0"/>
+                    </a:p>
+                  </a:txBody>
+                  <a:tcPr/>
+                </a:tc>
+                <a:tc>
+                  <a:txBody>
+                    <a:bodyPr/>
+                    <a:lstStyle/>
+                    <a:p>
                       <a:endParaRPr lang="en-SG"/>
                     </a:p>
                   </a:txBody>
@@ -4636,80 +4546,119 @@
                     <a:bodyPr/>
                     <a:lstStyle/>
                     <a:p>
-                      <a:endParaRPr lang="en-SG"/>
-                    </a:p>
-                  </a:txBody>
-                  <a:tcPr/>
-                </a:tc>
-                <a:tc>
-                  <a:txBody>
-                    <a:bodyPr/>
-                    <a:lstStyle/>
-                    <a:p>
-                      <a:endParaRPr lang="en-SG"/>
-                    </a:p>
-                  </a:txBody>
-                  <a:tcPr/>
-                </a:tc>
-                <a:tc>
-                  <a:txBody>
-                    <a:bodyPr/>
-                    <a:lstStyle/>
-                    <a:p>
-                      <a:endParaRPr lang="en-SG"/>
-                    </a:p>
-                  </a:txBody>
-                  <a:tcPr/>
-                </a:tc>
-                <a:tc>
-                  <a:txBody>
-                    <a:bodyPr/>
-                    <a:lstStyle/>
-                    <a:p>
-                      <a:endParaRPr lang="en-SG"/>
-                    </a:p>
-                  </a:txBody>
-                  <a:tcPr/>
-                </a:tc>
-                <a:tc>
-                  <a:txBody>
-                    <a:bodyPr/>
-                    <a:lstStyle/>
-                    <a:p>
-                      <a:endParaRPr lang="en-SG"/>
-                    </a:p>
-                  </a:txBody>
-                  <a:tcPr/>
-                </a:tc>
-                <a:tc>
-                  <a:txBody>
-                    <a:bodyPr/>
-                    <a:lstStyle/>
-                    <a:p>
-                      <a:endParaRPr lang="en-SG" dirty="0"/>
-                    </a:p>
-                  </a:txBody>
-                  <a:tcPr/>
-                </a:tc>
-                <a:tc>
-                  <a:txBody>
-                    <a:bodyPr/>
-                    <a:lstStyle/>
-                    <a:p>
-                      <a:endParaRPr lang="en-SG" dirty="0"/>
-                    </a:p>
-                  </a:txBody>
-                  <a:tcPr/>
-                </a:tc>
-                <a:tc>
-                  <a:txBody>
-                    <a:bodyPr/>
-                    <a:lstStyle/>
-                    <a:p>
-                      <a:endParaRPr lang="en-SG" dirty="0"/>
-                    </a:p>
-                  </a:txBody>
-                  <a:tcPr/>
+                      <a:endParaRPr lang="en-SG" dirty="0"/>
+                    </a:p>
+                  </a:txBody>
+                  <a:tcPr>
+                    <a:solidFill>
+                      <a:schemeClr val="tx1">
+                        <a:lumMod val="50000"/>
+                        <a:lumOff val="50000"/>
+                      </a:schemeClr>
+                    </a:solidFill>
+                  </a:tcPr>
+                </a:tc>
+                <a:tc>
+                  <a:txBody>
+                    <a:bodyPr/>
+                    <a:lstStyle/>
+                    <a:p>
+                      <a:endParaRPr lang="en-SG" dirty="0"/>
+                    </a:p>
+                  </a:txBody>
+                  <a:tcPr>
+                    <a:solidFill>
+                      <a:schemeClr val="tx1">
+                        <a:lumMod val="50000"/>
+                        <a:lumOff val="50000"/>
+                      </a:schemeClr>
+                    </a:solidFill>
+                  </a:tcPr>
+                </a:tc>
+                <a:tc>
+                  <a:txBody>
+                    <a:bodyPr/>
+                    <a:lstStyle/>
+                    <a:p>
+                      <a:endParaRPr lang="en-SG" dirty="0"/>
+                    </a:p>
+                  </a:txBody>
+                  <a:tcPr>
+                    <a:solidFill>
+                      <a:schemeClr val="tx1">
+                        <a:lumMod val="50000"/>
+                        <a:lumOff val="50000"/>
+                      </a:schemeClr>
+                    </a:solidFill>
+                  </a:tcPr>
+                </a:tc>
+                <a:tc>
+                  <a:txBody>
+                    <a:bodyPr/>
+                    <a:lstStyle/>
+                    <a:p>
+                      <a:endParaRPr lang="en-SG" dirty="0"/>
+                    </a:p>
+                  </a:txBody>
+                  <a:tcPr>
+                    <a:solidFill>
+                      <a:schemeClr val="tx1">
+                        <a:lumMod val="50000"/>
+                        <a:lumOff val="50000"/>
+                      </a:schemeClr>
+                    </a:solidFill>
+                  </a:tcPr>
+                </a:tc>
+                <a:tc>
+                  <a:txBody>
+                    <a:bodyPr/>
+                    <a:lstStyle/>
+                    <a:p>
+                      <a:endParaRPr lang="en-SG" dirty="0"/>
+                    </a:p>
+                  </a:txBody>
+                  <a:tcPr>
+                    <a:solidFill>
+                      <a:schemeClr val="tx1">
+                        <a:lumMod val="50000"/>
+                        <a:lumOff val="50000"/>
+                      </a:schemeClr>
+                    </a:solidFill>
+                  </a:tcPr>
+                </a:tc>
+                <a:tc>
+                  <a:txBody>
+                    <a:bodyPr/>
+                    <a:lstStyle/>
+                    <a:p>
+                      <a:endParaRPr lang="en-SG" dirty="0"/>
+                    </a:p>
+                  </a:txBody>
+                  <a:tcPr>
+                    <a:solidFill>
+                      <a:schemeClr val="tx1">
+                        <a:lumMod val="50000"/>
+                        <a:lumOff val="50000"/>
+                      </a:schemeClr>
+                    </a:solidFill>
+                  </a:tcPr>
+                </a:tc>
+                <a:tc>
+                  <a:txBody>
+                    <a:bodyPr/>
+                    <a:lstStyle/>
+                    <a:p>
+                      <a:endParaRPr lang="en-SG" dirty="0"/>
+                    </a:p>
+                  </a:txBody>
+                  <a:tcPr>
+                    <a:solidFill>
+                      <a:schemeClr val="tx1">
+                        <a:lumMod val="50000"/>
+                        <a:lumOff val="50000"/>
+                      </a:schemeClr>
+                    </a:solidFill>
+                  </a:tcPr>
                 </a:tc>
                 <a:extLst>
                   <a:ext uri="{0D108BD9-81ED-4DB2-BD59-A6C34878D82A}">
@@ -4735,7 +4684,7 @@
         </p:nvSpPr>
         <p:spPr>
           <a:xfrm>
-            <a:off x="5476875" y="114300"/>
+            <a:off x="5800726" y="-89434"/>
             <a:ext cx="899605" cy="523220"/>
           </a:xfrm>
           <a:prstGeom prst="rect">
@@ -4771,14 +4720,14 @@
           <p:nvPr>
             <p:extLst>
               <p:ext uri="{D42A27DB-BD31-4B8C-83A1-F6EECF244321}">
-                <p14:modId xmlns:p14="http://schemas.microsoft.com/office/powerpoint/2010/main" val="3981523226"/>
+                <p14:modId xmlns:p14="http://schemas.microsoft.com/office/powerpoint/2010/main" val="501209534"/>
               </p:ext>
             </p:extLst>
           </p:nvPr>
         </p:nvGraphicFramePr>
         <p:xfrm>
-          <a:off x="269875" y="4920191"/>
-          <a:ext cx="2254250" cy="1828800"/>
+          <a:off x="4750903" y="7051482"/>
+          <a:ext cx="3299791" cy="2377440"/>
         </p:xfrm>
         <a:graphic>
           <a:graphicData uri="http://schemas.openxmlformats.org/drawingml/2006/table">
@@ -4787,14 +4736,14 @@
                 <a:tableStyleId>{EB344D84-9AFB-497E-A393-DC336BA19D2E}</a:tableStyleId>
               </a:tblPr>
               <a:tblGrid>
-                <a:gridCol w="1127125">
+                <a:gridCol w="1183674">
                   <a:extLst>
                     <a:ext uri="{9D8B030D-6E8A-4147-A177-3AD203B41FA5}">
                       <a16:colId xmlns:a16="http://schemas.microsoft.com/office/drawing/2014/main" val="2100591671"/>
                     </a:ext>
                   </a:extLst>
                 </a:gridCol>
-                <a:gridCol w="1127125">
+                <a:gridCol w="2116117">
                   <a:extLst>
                     <a:ext uri="{9D8B030D-6E8A-4147-A177-3AD203B41FA5}">
                       <a16:colId xmlns:a16="http://schemas.microsoft.com/office/drawing/2014/main" val="878663953"/>
@@ -4802,14 +4751,14 @@
                   </a:extLst>
                 </a:gridCol>
               </a:tblGrid>
-              <a:tr h="248497">
+              <a:tr h="360000">
                 <a:tc>
                   <a:txBody>
                     <a:bodyPr/>
                     <a:lstStyle/>
                     <a:p>
                       <a:r>
-                        <a:rPr lang="en-SG" dirty="0"/>
+                        <a:rPr lang="en-SG" sz="2000" dirty="0"/>
                         <a:t>Colour</a:t>
                       </a:r>
                     </a:p>
@@ -4822,7 +4771,7 @@
                     <a:lstStyle/>
                     <a:p>
                       <a:r>
-                        <a:rPr lang="en-SG" dirty="0"/>
+                        <a:rPr lang="en-SG" sz="2000" dirty="0"/>
                         <a:t>Member</a:t>
                       </a:r>
                     </a:p>
@@ -4835,13 +4784,13 @@
                   </a:ext>
                 </a:extLst>
               </a:tr>
-              <a:tr h="248497">
-                <a:tc>
-                  <a:txBody>
-                    <a:bodyPr/>
-                    <a:lstStyle/>
-                    <a:p>
-                      <a:endParaRPr lang="en-SG" dirty="0"/>
+              <a:tr h="360000">
+                <a:tc>
+                  <a:txBody>
+                    <a:bodyPr/>
+                    <a:lstStyle/>
+                    <a:p>
+                      <a:endParaRPr lang="en-SG" sz="2000" dirty="0"/>
                     </a:p>
                   </a:txBody>
                   <a:tcPr>
@@ -4858,11 +4807,11 @@
                     <a:lstStyle/>
                     <a:p>
                       <a:r>
-                        <a:rPr lang="en-SG" dirty="0" err="1"/>
+                        <a:rPr lang="en-SG" sz="2000" dirty="0" err="1"/>
                         <a:t>Gui</a:t>
                       </a:r>
                       <a:r>
-                        <a:rPr lang="en-SG" dirty="0"/>
+                        <a:rPr lang="en-SG" sz="2000" dirty="0"/>
                         <a:t> An</a:t>
                       </a:r>
                     </a:p>
@@ -4875,13 +4824,13 @@
                   </a:ext>
                 </a:extLst>
               </a:tr>
-              <a:tr h="248497">
-                <a:tc>
-                  <a:txBody>
-                    <a:bodyPr/>
-                    <a:lstStyle/>
-                    <a:p>
-                      <a:endParaRPr lang="en-SG" dirty="0"/>
+              <a:tr h="360000">
+                <a:tc>
+                  <a:txBody>
+                    <a:bodyPr/>
+                    <a:lstStyle/>
+                    <a:p>
+                      <a:endParaRPr lang="en-SG" sz="2000" dirty="0"/>
                     </a:p>
                   </a:txBody>
                   <a:tcPr>
@@ -4896,7 +4845,7 @@
                     <a:lstStyle/>
                     <a:p>
                       <a:r>
-                        <a:rPr lang="en-SG" dirty="0"/>
+                        <a:rPr lang="en-SG" sz="2000" dirty="0"/>
                         <a:t>Dominic</a:t>
                       </a:r>
                     </a:p>
@@ -4909,13 +4858,13 @@
                   </a:ext>
                 </a:extLst>
               </a:tr>
-              <a:tr h="248497">
-                <a:tc>
-                  <a:txBody>
-                    <a:bodyPr/>
-                    <a:lstStyle/>
-                    <a:p>
-                      <a:endParaRPr lang="en-SG" dirty="0"/>
+              <a:tr h="360000">
+                <a:tc>
+                  <a:txBody>
+                    <a:bodyPr/>
+                    <a:lstStyle/>
+                    <a:p>
+                      <a:endParaRPr lang="en-SG" sz="2000" dirty="0"/>
                     </a:p>
                   </a:txBody>
                   <a:tcPr>
@@ -4930,7 +4879,7 @@
                     <a:lstStyle/>
                     <a:p>
                       <a:r>
-                        <a:rPr lang="en-SG" dirty="0"/>
+                        <a:rPr lang="en-SG" sz="2000" dirty="0"/>
                         <a:t>Rachel</a:t>
                       </a:r>
                     </a:p>
@@ -4943,13 +4892,13 @@
                   </a:ext>
                 </a:extLst>
               </a:tr>
-              <a:tr h="248497">
-                <a:tc>
-                  <a:txBody>
-                    <a:bodyPr/>
-                    <a:lstStyle/>
-                    <a:p>
-                      <a:endParaRPr lang="en-SG" dirty="0"/>
+              <a:tr h="360000">
+                <a:tc>
+                  <a:txBody>
+                    <a:bodyPr/>
+                    <a:lstStyle/>
+                    <a:p>
+                      <a:endParaRPr lang="en-SG" sz="2000" dirty="0"/>
                     </a:p>
                   </a:txBody>
                   <a:tcPr>
@@ -4967,7 +4916,7 @@
                     <a:lstStyle/>
                     <a:p>
                       <a:r>
-                        <a:rPr lang="en-SG" dirty="0"/>
+                        <a:rPr lang="en-SG" sz="2000" dirty="0"/>
                         <a:t>Ashlyn</a:t>
                       </a:r>
                     </a:p>
@@ -4977,6 +4926,43 @@
                 <a:extLst>
                   <a:ext uri="{0D108BD9-81ED-4DB2-BD59-A6C34878D82A}">
                     <a16:rowId xmlns:a16="http://schemas.microsoft.com/office/drawing/2014/main" val="843928281"/>
+                  </a:ext>
+                </a:extLst>
+              </a:tr>
+              <a:tr h="0">
+                <a:tc>
+                  <a:txBody>
+                    <a:bodyPr/>
+                    <a:lstStyle/>
+                    <a:p>
+                      <a:endParaRPr lang="en-SG" sz="2000" dirty="0"/>
+                    </a:p>
+                  </a:txBody>
+                  <a:tcPr>
+                    <a:solidFill>
+                      <a:schemeClr val="tx1">
+                        <a:lumMod val="50000"/>
+                        <a:lumOff val="50000"/>
+                      </a:schemeClr>
+                    </a:solidFill>
+                  </a:tcPr>
+                </a:tc>
+                <a:tc>
+                  <a:txBody>
+                    <a:bodyPr/>
+                    <a:lstStyle/>
+                    <a:p>
+                      <a:r>
+                        <a:rPr lang="en-SG" sz="2000" dirty="0"/>
+                        <a:t>All</a:t>
+                      </a:r>
+                    </a:p>
+                  </a:txBody>
+                  <a:tcPr/>
+                </a:tc>
+                <a:extLst>
+                  <a:ext uri="{0D108BD9-81ED-4DB2-BD59-A6C34878D82A}">
+                    <a16:rowId xmlns:a16="http://schemas.microsoft.com/office/drawing/2014/main" val="1457921267"/>
                   </a:ext>
                 </a:extLst>
               </a:tr>
@@ -5000,7 +4986,7 @@
 <file path=ppt/theme/theme1.xml><?xml version="1.0" encoding="utf-8"?>
 <a:theme xmlns:a="http://schemas.openxmlformats.org/drawingml/2006/main" name="Office Theme">
   <a:themeElements>
-    <a:clrScheme name="Office">
+    <a:clrScheme name="Office Theme">
       <a:dk1>
         <a:sysClr val="windowText" lastClr="000000"/>
       </a:dk1>
@@ -5038,7 +5024,7 @@
         <a:srgbClr val="954F72"/>
       </a:folHlink>
     </a:clrScheme>
-    <a:fontScheme name="Office">
+    <a:fontScheme name="Office Theme">
       <a:majorFont>
         <a:latin typeface="Calibri Light" panose="020F0302020204030204"/>
         <a:ea typeface=""/>
@@ -5073,23 +5059,6 @@
         <a:font script="Viet" typeface="Times New Roman"/>
         <a:font script="Uigh" typeface="Microsoft Uighur"/>
         <a:font script="Geor" typeface="Sylfaen"/>
-        <a:font script="Armn" typeface="Arial"/>
-        <a:font script="Bugi" typeface="Leelawadee UI"/>
-        <a:font script="Bopo" typeface="Microsoft JhengHei"/>
-        <a:font script="Java" typeface="Javanese Text"/>
-        <a:font script="Lisu" typeface="Segoe UI"/>
-        <a:font script="Mymr" typeface="Myanmar Text"/>
-        <a:font script="Nkoo" typeface="Ebrima"/>
-        <a:font script="Olck" typeface="Nirmala UI"/>
-        <a:font script="Osma" typeface="Ebrima"/>
-        <a:font script="Phag" typeface="Phagspa"/>
-        <a:font script="Syrn" typeface="Estrangelo Edessa"/>
-        <a:font script="Syrj" typeface="Estrangelo Edessa"/>
-        <a:font script="Syre" typeface="Estrangelo Edessa"/>
-        <a:font script="Sora" typeface="Nirmala UI"/>
-        <a:font script="Tale" typeface="Microsoft Tai Le"/>
-        <a:font script="Talu" typeface="Microsoft New Tai Lue"/>
-        <a:font script="Tfng" typeface="Ebrima"/>
       </a:majorFont>
       <a:minorFont>
         <a:latin typeface="Calibri" panose="020F0502020204030204"/>
@@ -5125,26 +5094,9 @@
         <a:font script="Viet" typeface="Arial"/>
         <a:font script="Uigh" typeface="Microsoft Uighur"/>
         <a:font script="Geor" typeface="Sylfaen"/>
-        <a:font script="Armn" typeface="Arial"/>
-        <a:font script="Bugi" typeface="Leelawadee UI"/>
-        <a:font script="Bopo" typeface="Microsoft JhengHei"/>
-        <a:font script="Java" typeface="Javanese Text"/>
-        <a:font script="Lisu" typeface="Segoe UI"/>
-        <a:font script="Mymr" typeface="Myanmar Text"/>
-        <a:font script="Nkoo" typeface="Ebrima"/>
-        <a:font script="Olck" typeface="Nirmala UI"/>
-        <a:font script="Osma" typeface="Ebrima"/>
-        <a:font script="Phag" typeface="Phagspa"/>
-        <a:font script="Syrn" typeface="Estrangelo Edessa"/>
-        <a:font script="Syrj" typeface="Estrangelo Edessa"/>
-        <a:font script="Syre" typeface="Estrangelo Edessa"/>
-        <a:font script="Sora" typeface="Nirmala UI"/>
-        <a:font script="Tale" typeface="Microsoft Tai Le"/>
-        <a:font script="Talu" typeface="Microsoft New Tai Lue"/>
-        <a:font script="Tfng" typeface="Ebrima"/>
       </a:minorFont>
     </a:fontScheme>
-    <a:fmtScheme name="Office">
+    <a:fmtScheme name="Office Theme">
       <a:fillStyleLst>
         <a:solidFill>
           <a:schemeClr val="phClr"/>

</xml_diff>